<commit_message>
Adding some english shit, fuck EE330
</commit_message>
<xml_diff>
--- a/5th_Semester/EE_330/Materials/Fuck.pptx
+++ b/5th_Semester/EE_330/Materials/Fuck.pptx
@@ -5,7 +5,7 @@
     <p:sldMasterId id="2147483648" r:id="rId1"/>
   </p:sldMasterIdLst>
   <p:notesMasterIdLst>
-    <p:notesMasterId r:id="rId31"/>
+    <p:notesMasterId r:id="rId44"/>
   </p:notesMasterIdLst>
   <p:sldIdLst>
     <p:sldId id="267" r:id="rId2"/>
@@ -17,26 +17,39 @@
     <p:sldId id="262" r:id="rId8"/>
     <p:sldId id="263" r:id="rId9"/>
     <p:sldId id="266" r:id="rId10"/>
-    <p:sldId id="278" r:id="rId11"/>
-    <p:sldId id="279" r:id="rId12"/>
-    <p:sldId id="264" r:id="rId13"/>
-    <p:sldId id="277" r:id="rId14"/>
-    <p:sldId id="268" r:id="rId15"/>
-    <p:sldId id="269" r:id="rId16"/>
-    <p:sldId id="270" r:id="rId17"/>
-    <p:sldId id="271" r:id="rId18"/>
-    <p:sldId id="272" r:id="rId19"/>
-    <p:sldId id="273" r:id="rId20"/>
-    <p:sldId id="274" r:id="rId21"/>
-    <p:sldId id="275" r:id="rId22"/>
-    <p:sldId id="276" r:id="rId23"/>
-    <p:sldId id="280" r:id="rId24"/>
-    <p:sldId id="281" r:id="rId25"/>
-    <p:sldId id="282" r:id="rId26"/>
-    <p:sldId id="283" r:id="rId27"/>
-    <p:sldId id="284" r:id="rId28"/>
-    <p:sldId id="285" r:id="rId29"/>
-    <p:sldId id="286" r:id="rId30"/>
+    <p:sldId id="288" r:id="rId11"/>
+    <p:sldId id="298" r:id="rId12"/>
+    <p:sldId id="278" r:id="rId13"/>
+    <p:sldId id="279" r:id="rId14"/>
+    <p:sldId id="264" r:id="rId15"/>
+    <p:sldId id="277" r:id="rId16"/>
+    <p:sldId id="268" r:id="rId17"/>
+    <p:sldId id="269" r:id="rId18"/>
+    <p:sldId id="270" r:id="rId19"/>
+    <p:sldId id="271" r:id="rId20"/>
+    <p:sldId id="272" r:id="rId21"/>
+    <p:sldId id="289" r:id="rId22"/>
+    <p:sldId id="299" r:id="rId23"/>
+    <p:sldId id="273" r:id="rId24"/>
+    <p:sldId id="274" r:id="rId25"/>
+    <p:sldId id="275" r:id="rId26"/>
+    <p:sldId id="276" r:id="rId27"/>
+    <p:sldId id="280" r:id="rId28"/>
+    <p:sldId id="281" r:id="rId29"/>
+    <p:sldId id="282" r:id="rId30"/>
+    <p:sldId id="283" r:id="rId31"/>
+    <p:sldId id="284" r:id="rId32"/>
+    <p:sldId id="285" r:id="rId33"/>
+    <p:sldId id="286" r:id="rId34"/>
+    <p:sldId id="287" r:id="rId35"/>
+    <p:sldId id="290" r:id="rId36"/>
+    <p:sldId id="291" r:id="rId37"/>
+    <p:sldId id="292" r:id="rId38"/>
+    <p:sldId id="293" r:id="rId39"/>
+    <p:sldId id="294" r:id="rId40"/>
+    <p:sldId id="295" r:id="rId41"/>
+    <p:sldId id="296" r:id="rId42"/>
+    <p:sldId id="297" r:id="rId43"/>
   </p:sldIdLst>
   <p:sldSz cx="12192000" cy="6858000"/>
   <p:notesSz cx="6858000" cy="9144000"/>
@@ -135,6 +148,14 @@
       </a:defRPr>
     </a:lvl9pPr>
   </p:defaultTextStyle>
+  <p:extLst>
+    <p:ext uri="{EFAFB233-063F-42B5-8137-9DF3F51BA10A}">
+      <p15:sldGuideLst xmlns:p15="http://schemas.microsoft.com/office/powerpoint/2012/main"/>
+    </p:ext>
+    <p:ext uri="{2D200454-40CA-4A62-9FC3-DE9A4176ACB9}">
+      <p15:notesGuideLst xmlns:p15="http://schemas.microsoft.com/office/powerpoint/2012/main"/>
+    </p:ext>
+  </p:extLst>
 </p:presentation>
 </file>
 
@@ -220,7 +241,7 @@
           <a:p>
             <a:fld id="{A290D2A3-FC0E-4B3C-A916-CFD45919F6F1}" type="datetimeFigureOut">
               <a:rPr lang="en-US" smtClean="0"/>
-              <a:t>11/20/2019</a:t>
+              <a:t>11/22/2019</a:t>
             </a:fld>
             <a:endParaRPr lang="en-US"/>
           </a:p>
@@ -645,7 +666,7 @@
     </p:spTree>
     <p:extLst>
       <p:ext uri="{BB962C8B-B14F-4D97-AF65-F5344CB8AC3E}">
-        <p14:creationId xmlns:p14="http://schemas.microsoft.com/office/powerpoint/2010/main" val="1064122603"/>
+        <p14:creationId xmlns:p14="http://schemas.microsoft.com/office/powerpoint/2010/main" val="4205124079"/>
       </p:ext>
     </p:extLst>
   </p:cSld>
@@ -729,7 +750,7 @@
     </p:spTree>
     <p:extLst>
       <p:ext uri="{BB962C8B-B14F-4D97-AF65-F5344CB8AC3E}">
-        <p14:creationId xmlns:p14="http://schemas.microsoft.com/office/powerpoint/2010/main" val="522540178"/>
+        <p14:creationId xmlns:p14="http://schemas.microsoft.com/office/powerpoint/2010/main" val="937946380"/>
       </p:ext>
     </p:extLst>
   </p:cSld>
@@ -813,7 +834,7 @@
     </p:spTree>
     <p:extLst>
       <p:ext uri="{BB962C8B-B14F-4D97-AF65-F5344CB8AC3E}">
-        <p14:creationId xmlns:p14="http://schemas.microsoft.com/office/powerpoint/2010/main" val="3842618195"/>
+        <p14:creationId xmlns:p14="http://schemas.microsoft.com/office/powerpoint/2010/main" val="1064122603"/>
       </p:ext>
     </p:extLst>
   </p:cSld>
@@ -897,7 +918,7 @@
     </p:spTree>
     <p:extLst>
       <p:ext uri="{BB962C8B-B14F-4D97-AF65-F5344CB8AC3E}">
-        <p14:creationId xmlns:p14="http://schemas.microsoft.com/office/powerpoint/2010/main" val="4264612769"/>
+        <p14:creationId xmlns:p14="http://schemas.microsoft.com/office/powerpoint/2010/main" val="522540178"/>
       </p:ext>
     </p:extLst>
   </p:cSld>
@@ -981,7 +1002,7 @@
     </p:spTree>
     <p:extLst>
       <p:ext uri="{BB962C8B-B14F-4D97-AF65-F5344CB8AC3E}">
-        <p14:creationId xmlns:p14="http://schemas.microsoft.com/office/powerpoint/2010/main" val="625338353"/>
+        <p14:creationId xmlns:p14="http://schemas.microsoft.com/office/powerpoint/2010/main" val="3842618195"/>
       </p:ext>
     </p:extLst>
   </p:cSld>
@@ -1065,7 +1086,7 @@
     </p:spTree>
     <p:extLst>
       <p:ext uri="{BB962C8B-B14F-4D97-AF65-F5344CB8AC3E}">
-        <p14:creationId xmlns:p14="http://schemas.microsoft.com/office/powerpoint/2010/main" val="1068504674"/>
+        <p14:creationId xmlns:p14="http://schemas.microsoft.com/office/powerpoint/2010/main" val="1819906846"/>
       </p:ext>
     </p:extLst>
   </p:cSld>
@@ -1149,7 +1170,7 @@
     </p:spTree>
     <p:extLst>
       <p:ext uri="{BB962C8B-B14F-4D97-AF65-F5344CB8AC3E}">
-        <p14:creationId xmlns:p14="http://schemas.microsoft.com/office/powerpoint/2010/main" val="1216587170"/>
+        <p14:creationId xmlns:p14="http://schemas.microsoft.com/office/powerpoint/2010/main" val="817776539"/>
       </p:ext>
     </p:extLst>
   </p:cSld>
@@ -1233,7 +1254,7 @@
     </p:spTree>
     <p:extLst>
       <p:ext uri="{BB962C8B-B14F-4D97-AF65-F5344CB8AC3E}">
-        <p14:creationId xmlns:p14="http://schemas.microsoft.com/office/powerpoint/2010/main" val="1588869797"/>
+        <p14:creationId xmlns:p14="http://schemas.microsoft.com/office/powerpoint/2010/main" val="4264612769"/>
       </p:ext>
     </p:extLst>
   </p:cSld>
@@ -1317,7 +1338,7 @@
     </p:spTree>
     <p:extLst>
       <p:ext uri="{BB962C8B-B14F-4D97-AF65-F5344CB8AC3E}">
-        <p14:creationId xmlns:p14="http://schemas.microsoft.com/office/powerpoint/2010/main" val="2864314911"/>
+        <p14:creationId xmlns:p14="http://schemas.microsoft.com/office/powerpoint/2010/main" val="625338353"/>
       </p:ext>
     </p:extLst>
   </p:cSld>
@@ -1401,7 +1422,7 @@
     </p:spTree>
     <p:extLst>
       <p:ext uri="{BB962C8B-B14F-4D97-AF65-F5344CB8AC3E}">
-        <p14:creationId xmlns:p14="http://schemas.microsoft.com/office/powerpoint/2010/main" val="4128610989"/>
+        <p14:creationId xmlns:p14="http://schemas.microsoft.com/office/powerpoint/2010/main" val="1068504674"/>
       </p:ext>
     </p:extLst>
   </p:cSld>
@@ -1569,7 +1590,7 @@
     </p:spTree>
     <p:extLst>
       <p:ext uri="{BB962C8B-B14F-4D97-AF65-F5344CB8AC3E}">
-        <p14:creationId xmlns:p14="http://schemas.microsoft.com/office/powerpoint/2010/main" val="918147043"/>
+        <p14:creationId xmlns:p14="http://schemas.microsoft.com/office/powerpoint/2010/main" val="1216587170"/>
       </p:ext>
     </p:extLst>
   </p:cSld>
@@ -1653,7 +1674,7 @@
     </p:spTree>
     <p:extLst>
       <p:ext uri="{BB962C8B-B14F-4D97-AF65-F5344CB8AC3E}">
-        <p14:creationId xmlns:p14="http://schemas.microsoft.com/office/powerpoint/2010/main" val="1720336841"/>
+        <p14:creationId xmlns:p14="http://schemas.microsoft.com/office/powerpoint/2010/main" val="1588869797"/>
       </p:ext>
     </p:extLst>
   </p:cSld>
@@ -1737,7 +1758,7 @@
     </p:spTree>
     <p:extLst>
       <p:ext uri="{BB962C8B-B14F-4D97-AF65-F5344CB8AC3E}">
-        <p14:creationId xmlns:p14="http://schemas.microsoft.com/office/powerpoint/2010/main" val="1938609401"/>
+        <p14:creationId xmlns:p14="http://schemas.microsoft.com/office/powerpoint/2010/main" val="2864314911"/>
       </p:ext>
     </p:extLst>
   </p:cSld>
@@ -1821,7 +1842,511 @@
     </p:spTree>
     <p:extLst>
       <p:ext uri="{BB962C8B-B14F-4D97-AF65-F5344CB8AC3E}">
+        <p14:creationId xmlns:p14="http://schemas.microsoft.com/office/powerpoint/2010/main" val="4128610989"/>
+      </p:ext>
+    </p:extLst>
+  </p:cSld>
+  <p:clrMapOvr>
+    <a:masterClrMapping/>
+  </p:clrMapOvr>
+</p:notes>
+</file>
+
+<file path=ppt/notesSlides/notesSlide24.xml><?xml version="1.0" encoding="utf-8"?>
+<p:notes xmlns:a="http://schemas.openxmlformats.org/drawingml/2006/main" xmlns:r="http://schemas.openxmlformats.org/officeDocument/2006/relationships" xmlns:p="http://schemas.openxmlformats.org/presentationml/2006/main">
+  <p:cSld>
+    <p:spTree>
+      <p:nvGrpSpPr>
+        <p:cNvPr id="1" name=""/>
+        <p:cNvGrpSpPr/>
+        <p:nvPr/>
+      </p:nvGrpSpPr>
+      <p:grpSpPr>
+        <a:xfrm>
+          <a:off x="0" y="0"/>
+          <a:ext cx="0" cy="0"/>
+          <a:chOff x="0" y="0"/>
+          <a:chExt cx="0" cy="0"/>
+        </a:xfrm>
+      </p:grpSpPr>
+      <p:sp>
+        <p:nvSpPr>
+          <p:cNvPr id="2" name="Slide Image Placeholder 1"/>
+          <p:cNvSpPr>
+            <a:spLocks noGrp="1" noRot="1" noChangeAspect="1"/>
+          </p:cNvSpPr>
+          <p:nvPr>
+            <p:ph type="sldImg"/>
+          </p:nvPr>
+        </p:nvSpPr>
+        <p:spPr/>
+      </p:sp>
+      <p:sp>
+        <p:nvSpPr>
+          <p:cNvPr id="3" name="Notes Placeholder 2"/>
+          <p:cNvSpPr>
+            <a:spLocks noGrp="1"/>
+          </p:cNvSpPr>
+          <p:nvPr>
+            <p:ph type="body" idx="1"/>
+          </p:nvPr>
+        </p:nvSpPr>
+        <p:spPr/>
+        <p:txBody>
+          <a:bodyPr/>
+          <a:lstStyle/>
+          <a:p>
+            <a:endParaRPr lang="en-US"/>
+          </a:p>
+        </p:txBody>
+      </p:sp>
+      <p:sp>
+        <p:nvSpPr>
+          <p:cNvPr id="4" name="Slide Number Placeholder 3"/>
+          <p:cNvSpPr>
+            <a:spLocks noGrp="1"/>
+          </p:cNvSpPr>
+          <p:nvPr>
+            <p:ph type="sldNum" sz="quarter" idx="5"/>
+          </p:nvPr>
+        </p:nvSpPr>
+        <p:spPr/>
+        <p:txBody>
+          <a:bodyPr/>
+          <a:lstStyle/>
+          <a:p>
+            <a:fld id="{F90DFFEC-8158-4D22-9DF3-EA2341720A84}" type="slidenum">
+              <a:rPr lang="en-US" smtClean="0"/>
+              <a:t>30</a:t>
+            </a:fld>
+            <a:endParaRPr lang="en-US"/>
+          </a:p>
+        </p:txBody>
+      </p:sp>
+    </p:spTree>
+    <p:extLst>
+      <p:ext uri="{BB962C8B-B14F-4D97-AF65-F5344CB8AC3E}">
+        <p14:creationId xmlns:p14="http://schemas.microsoft.com/office/powerpoint/2010/main" val="918147043"/>
+      </p:ext>
+    </p:extLst>
+  </p:cSld>
+  <p:clrMapOvr>
+    <a:masterClrMapping/>
+  </p:clrMapOvr>
+</p:notes>
+</file>
+
+<file path=ppt/notesSlides/notesSlide25.xml><?xml version="1.0" encoding="utf-8"?>
+<p:notes xmlns:a="http://schemas.openxmlformats.org/drawingml/2006/main" xmlns:r="http://schemas.openxmlformats.org/officeDocument/2006/relationships" xmlns:p="http://schemas.openxmlformats.org/presentationml/2006/main">
+  <p:cSld>
+    <p:spTree>
+      <p:nvGrpSpPr>
+        <p:cNvPr id="1" name=""/>
+        <p:cNvGrpSpPr/>
+        <p:nvPr/>
+      </p:nvGrpSpPr>
+      <p:grpSpPr>
+        <a:xfrm>
+          <a:off x="0" y="0"/>
+          <a:ext cx="0" cy="0"/>
+          <a:chOff x="0" y="0"/>
+          <a:chExt cx="0" cy="0"/>
+        </a:xfrm>
+      </p:grpSpPr>
+      <p:sp>
+        <p:nvSpPr>
+          <p:cNvPr id="2" name="Slide Image Placeholder 1"/>
+          <p:cNvSpPr>
+            <a:spLocks noGrp="1" noRot="1" noChangeAspect="1"/>
+          </p:cNvSpPr>
+          <p:nvPr>
+            <p:ph type="sldImg"/>
+          </p:nvPr>
+        </p:nvSpPr>
+        <p:spPr/>
+      </p:sp>
+      <p:sp>
+        <p:nvSpPr>
+          <p:cNvPr id="3" name="Notes Placeholder 2"/>
+          <p:cNvSpPr>
+            <a:spLocks noGrp="1"/>
+          </p:cNvSpPr>
+          <p:nvPr>
+            <p:ph type="body" idx="1"/>
+          </p:nvPr>
+        </p:nvSpPr>
+        <p:spPr/>
+        <p:txBody>
+          <a:bodyPr/>
+          <a:lstStyle/>
+          <a:p>
+            <a:endParaRPr lang="en-US"/>
+          </a:p>
+        </p:txBody>
+      </p:sp>
+      <p:sp>
+        <p:nvSpPr>
+          <p:cNvPr id="4" name="Slide Number Placeholder 3"/>
+          <p:cNvSpPr>
+            <a:spLocks noGrp="1"/>
+          </p:cNvSpPr>
+          <p:nvPr>
+            <p:ph type="sldNum" sz="quarter" idx="5"/>
+          </p:nvPr>
+        </p:nvSpPr>
+        <p:spPr/>
+        <p:txBody>
+          <a:bodyPr/>
+          <a:lstStyle/>
+          <a:p>
+            <a:fld id="{F90DFFEC-8158-4D22-9DF3-EA2341720A84}" type="slidenum">
+              <a:rPr lang="en-US" smtClean="0"/>
+              <a:t>31</a:t>
+            </a:fld>
+            <a:endParaRPr lang="en-US"/>
+          </a:p>
+        </p:txBody>
+      </p:sp>
+    </p:spTree>
+    <p:extLst>
+      <p:ext uri="{BB962C8B-B14F-4D97-AF65-F5344CB8AC3E}">
+        <p14:creationId xmlns:p14="http://schemas.microsoft.com/office/powerpoint/2010/main" val="1720336841"/>
+      </p:ext>
+    </p:extLst>
+  </p:cSld>
+  <p:clrMapOvr>
+    <a:masterClrMapping/>
+  </p:clrMapOvr>
+</p:notes>
+</file>
+
+<file path=ppt/notesSlides/notesSlide26.xml><?xml version="1.0" encoding="utf-8"?>
+<p:notes xmlns:a="http://schemas.openxmlformats.org/drawingml/2006/main" xmlns:r="http://schemas.openxmlformats.org/officeDocument/2006/relationships" xmlns:p="http://schemas.openxmlformats.org/presentationml/2006/main">
+  <p:cSld>
+    <p:spTree>
+      <p:nvGrpSpPr>
+        <p:cNvPr id="1" name=""/>
+        <p:cNvGrpSpPr/>
+        <p:nvPr/>
+      </p:nvGrpSpPr>
+      <p:grpSpPr>
+        <a:xfrm>
+          <a:off x="0" y="0"/>
+          <a:ext cx="0" cy="0"/>
+          <a:chOff x="0" y="0"/>
+          <a:chExt cx="0" cy="0"/>
+        </a:xfrm>
+      </p:grpSpPr>
+      <p:sp>
+        <p:nvSpPr>
+          <p:cNvPr id="2" name="Slide Image Placeholder 1"/>
+          <p:cNvSpPr>
+            <a:spLocks noGrp="1" noRot="1" noChangeAspect="1"/>
+          </p:cNvSpPr>
+          <p:nvPr>
+            <p:ph type="sldImg"/>
+          </p:nvPr>
+        </p:nvSpPr>
+        <p:spPr/>
+      </p:sp>
+      <p:sp>
+        <p:nvSpPr>
+          <p:cNvPr id="3" name="Notes Placeholder 2"/>
+          <p:cNvSpPr>
+            <a:spLocks noGrp="1"/>
+          </p:cNvSpPr>
+          <p:nvPr>
+            <p:ph type="body" idx="1"/>
+          </p:nvPr>
+        </p:nvSpPr>
+        <p:spPr/>
+        <p:txBody>
+          <a:bodyPr/>
+          <a:lstStyle/>
+          <a:p>
+            <a:endParaRPr lang="en-US"/>
+          </a:p>
+        </p:txBody>
+      </p:sp>
+      <p:sp>
+        <p:nvSpPr>
+          <p:cNvPr id="4" name="Slide Number Placeholder 3"/>
+          <p:cNvSpPr>
+            <a:spLocks noGrp="1"/>
+          </p:cNvSpPr>
+          <p:nvPr>
+            <p:ph type="sldNum" sz="quarter" idx="5"/>
+          </p:nvPr>
+        </p:nvSpPr>
+        <p:spPr/>
+        <p:txBody>
+          <a:bodyPr/>
+          <a:lstStyle/>
+          <a:p>
+            <a:fld id="{F90DFFEC-8158-4D22-9DF3-EA2341720A84}" type="slidenum">
+              <a:rPr lang="en-US" smtClean="0"/>
+              <a:t>32</a:t>
+            </a:fld>
+            <a:endParaRPr lang="en-US"/>
+          </a:p>
+        </p:txBody>
+      </p:sp>
+    </p:spTree>
+    <p:extLst>
+      <p:ext uri="{BB962C8B-B14F-4D97-AF65-F5344CB8AC3E}">
+        <p14:creationId xmlns:p14="http://schemas.microsoft.com/office/powerpoint/2010/main" val="1938609401"/>
+      </p:ext>
+    </p:extLst>
+  </p:cSld>
+  <p:clrMapOvr>
+    <a:masterClrMapping/>
+  </p:clrMapOvr>
+</p:notes>
+</file>
+
+<file path=ppt/notesSlides/notesSlide27.xml><?xml version="1.0" encoding="utf-8"?>
+<p:notes xmlns:a="http://schemas.openxmlformats.org/drawingml/2006/main" xmlns:r="http://schemas.openxmlformats.org/officeDocument/2006/relationships" xmlns:p="http://schemas.openxmlformats.org/presentationml/2006/main">
+  <p:cSld>
+    <p:spTree>
+      <p:nvGrpSpPr>
+        <p:cNvPr id="1" name=""/>
+        <p:cNvGrpSpPr/>
+        <p:nvPr/>
+      </p:nvGrpSpPr>
+      <p:grpSpPr>
+        <a:xfrm>
+          <a:off x="0" y="0"/>
+          <a:ext cx="0" cy="0"/>
+          <a:chOff x="0" y="0"/>
+          <a:chExt cx="0" cy="0"/>
+        </a:xfrm>
+      </p:grpSpPr>
+      <p:sp>
+        <p:nvSpPr>
+          <p:cNvPr id="2" name="Slide Image Placeholder 1"/>
+          <p:cNvSpPr>
+            <a:spLocks noGrp="1" noRot="1" noChangeAspect="1"/>
+          </p:cNvSpPr>
+          <p:nvPr>
+            <p:ph type="sldImg"/>
+          </p:nvPr>
+        </p:nvSpPr>
+        <p:spPr/>
+      </p:sp>
+      <p:sp>
+        <p:nvSpPr>
+          <p:cNvPr id="3" name="Notes Placeholder 2"/>
+          <p:cNvSpPr>
+            <a:spLocks noGrp="1"/>
+          </p:cNvSpPr>
+          <p:nvPr>
+            <p:ph type="body" idx="1"/>
+          </p:nvPr>
+        </p:nvSpPr>
+        <p:spPr/>
+        <p:txBody>
+          <a:bodyPr/>
+          <a:lstStyle/>
+          <a:p>
+            <a:endParaRPr lang="en-US"/>
+          </a:p>
+        </p:txBody>
+      </p:sp>
+      <p:sp>
+        <p:nvSpPr>
+          <p:cNvPr id="4" name="Slide Number Placeholder 3"/>
+          <p:cNvSpPr>
+            <a:spLocks noGrp="1"/>
+          </p:cNvSpPr>
+          <p:nvPr>
+            <p:ph type="sldNum" sz="quarter" idx="5"/>
+          </p:nvPr>
+        </p:nvSpPr>
+        <p:spPr/>
+        <p:txBody>
+          <a:bodyPr/>
+          <a:lstStyle/>
+          <a:p>
+            <a:fld id="{F90DFFEC-8158-4D22-9DF3-EA2341720A84}" type="slidenum">
+              <a:rPr lang="en-US" smtClean="0"/>
+              <a:t>33</a:t>
+            </a:fld>
+            <a:endParaRPr lang="en-US"/>
+          </a:p>
+        </p:txBody>
+      </p:sp>
+    </p:spTree>
+    <p:extLst>
+      <p:ext uri="{BB962C8B-B14F-4D97-AF65-F5344CB8AC3E}">
         <p14:creationId xmlns:p14="http://schemas.microsoft.com/office/powerpoint/2010/main" val="1428955364"/>
+      </p:ext>
+    </p:extLst>
+  </p:cSld>
+  <p:clrMapOvr>
+    <a:masterClrMapping/>
+  </p:clrMapOvr>
+</p:notes>
+</file>
+
+<file path=ppt/notesSlides/notesSlide28.xml><?xml version="1.0" encoding="utf-8"?>
+<p:notes xmlns:a="http://schemas.openxmlformats.org/drawingml/2006/main" xmlns:r="http://schemas.openxmlformats.org/officeDocument/2006/relationships" xmlns:p="http://schemas.openxmlformats.org/presentationml/2006/main">
+  <p:cSld>
+    <p:spTree>
+      <p:nvGrpSpPr>
+        <p:cNvPr id="1" name=""/>
+        <p:cNvGrpSpPr/>
+        <p:nvPr/>
+      </p:nvGrpSpPr>
+      <p:grpSpPr>
+        <a:xfrm>
+          <a:off x="0" y="0"/>
+          <a:ext cx="0" cy="0"/>
+          <a:chOff x="0" y="0"/>
+          <a:chExt cx="0" cy="0"/>
+        </a:xfrm>
+      </p:grpSpPr>
+      <p:sp>
+        <p:nvSpPr>
+          <p:cNvPr id="2" name="Slide Image Placeholder 1"/>
+          <p:cNvSpPr>
+            <a:spLocks noGrp="1" noRot="1" noChangeAspect="1"/>
+          </p:cNvSpPr>
+          <p:nvPr>
+            <p:ph type="sldImg"/>
+          </p:nvPr>
+        </p:nvSpPr>
+        <p:spPr/>
+      </p:sp>
+      <p:sp>
+        <p:nvSpPr>
+          <p:cNvPr id="3" name="Notes Placeholder 2"/>
+          <p:cNvSpPr>
+            <a:spLocks noGrp="1"/>
+          </p:cNvSpPr>
+          <p:nvPr>
+            <p:ph type="body" idx="1"/>
+          </p:nvPr>
+        </p:nvSpPr>
+        <p:spPr/>
+        <p:txBody>
+          <a:bodyPr/>
+          <a:lstStyle/>
+          <a:p>
+            <a:endParaRPr lang="en-US"/>
+          </a:p>
+        </p:txBody>
+      </p:sp>
+      <p:sp>
+        <p:nvSpPr>
+          <p:cNvPr id="4" name="Slide Number Placeholder 3"/>
+          <p:cNvSpPr>
+            <a:spLocks noGrp="1"/>
+          </p:cNvSpPr>
+          <p:nvPr>
+            <p:ph type="sldNum" sz="quarter" idx="5"/>
+          </p:nvPr>
+        </p:nvSpPr>
+        <p:spPr/>
+        <p:txBody>
+          <a:bodyPr/>
+          <a:lstStyle/>
+          <a:p>
+            <a:fld id="{F90DFFEC-8158-4D22-9DF3-EA2341720A84}" type="slidenum">
+              <a:rPr lang="en-US" smtClean="0"/>
+              <a:t>34</a:t>
+            </a:fld>
+            <a:endParaRPr lang="en-US"/>
+          </a:p>
+        </p:txBody>
+      </p:sp>
+    </p:spTree>
+    <p:extLst>
+      <p:ext uri="{BB962C8B-B14F-4D97-AF65-F5344CB8AC3E}">
+        <p14:creationId xmlns:p14="http://schemas.microsoft.com/office/powerpoint/2010/main" val="3487136522"/>
+      </p:ext>
+    </p:extLst>
+  </p:cSld>
+  <p:clrMapOvr>
+    <a:masterClrMapping/>
+  </p:clrMapOvr>
+</p:notes>
+</file>
+
+<file path=ppt/notesSlides/notesSlide29.xml><?xml version="1.0" encoding="utf-8"?>
+<p:notes xmlns:a="http://schemas.openxmlformats.org/drawingml/2006/main" xmlns:r="http://schemas.openxmlformats.org/officeDocument/2006/relationships" xmlns:p="http://schemas.openxmlformats.org/presentationml/2006/main">
+  <p:cSld>
+    <p:spTree>
+      <p:nvGrpSpPr>
+        <p:cNvPr id="1" name=""/>
+        <p:cNvGrpSpPr/>
+        <p:nvPr/>
+      </p:nvGrpSpPr>
+      <p:grpSpPr>
+        <a:xfrm>
+          <a:off x="0" y="0"/>
+          <a:ext cx="0" cy="0"/>
+          <a:chOff x="0" y="0"/>
+          <a:chExt cx="0" cy="0"/>
+        </a:xfrm>
+      </p:grpSpPr>
+      <p:sp>
+        <p:nvSpPr>
+          <p:cNvPr id="2" name="Slide Image Placeholder 1"/>
+          <p:cNvSpPr>
+            <a:spLocks noGrp="1" noRot="1" noChangeAspect="1"/>
+          </p:cNvSpPr>
+          <p:nvPr>
+            <p:ph type="sldImg"/>
+          </p:nvPr>
+        </p:nvSpPr>
+        <p:spPr/>
+      </p:sp>
+      <p:sp>
+        <p:nvSpPr>
+          <p:cNvPr id="3" name="Notes Placeholder 2"/>
+          <p:cNvSpPr>
+            <a:spLocks noGrp="1"/>
+          </p:cNvSpPr>
+          <p:nvPr>
+            <p:ph type="body" idx="1"/>
+          </p:nvPr>
+        </p:nvSpPr>
+        <p:spPr/>
+        <p:txBody>
+          <a:bodyPr/>
+          <a:lstStyle/>
+          <a:p>
+            <a:endParaRPr lang="en-US"/>
+          </a:p>
+        </p:txBody>
+      </p:sp>
+      <p:sp>
+        <p:nvSpPr>
+          <p:cNvPr id="4" name="Slide Number Placeholder 3"/>
+          <p:cNvSpPr>
+            <a:spLocks noGrp="1"/>
+          </p:cNvSpPr>
+          <p:nvPr>
+            <p:ph type="sldNum" sz="quarter" idx="5"/>
+          </p:nvPr>
+        </p:nvSpPr>
+        <p:spPr/>
+        <p:txBody>
+          <a:bodyPr/>
+          <a:lstStyle/>
+          <a:p>
+            <a:fld id="{F90DFFEC-8158-4D22-9DF3-EA2341720A84}" type="slidenum">
+              <a:rPr lang="en-US" smtClean="0"/>
+              <a:t>35</a:t>
+            </a:fld>
+            <a:endParaRPr lang="en-US"/>
+          </a:p>
+        </p:txBody>
+      </p:sp>
+    </p:spTree>
+    <p:extLst>
+      <p:ext uri="{BB962C8B-B14F-4D97-AF65-F5344CB8AC3E}">
+        <p14:creationId xmlns:p14="http://schemas.microsoft.com/office/powerpoint/2010/main" val="2095090334"/>
       </p:ext>
     </p:extLst>
   </p:cSld>
@@ -1915,6 +2440,594 @@
 </p:notes>
 </file>
 
+<file path=ppt/notesSlides/notesSlide30.xml><?xml version="1.0" encoding="utf-8"?>
+<p:notes xmlns:a="http://schemas.openxmlformats.org/drawingml/2006/main" xmlns:r="http://schemas.openxmlformats.org/officeDocument/2006/relationships" xmlns:p="http://schemas.openxmlformats.org/presentationml/2006/main">
+  <p:cSld>
+    <p:spTree>
+      <p:nvGrpSpPr>
+        <p:cNvPr id="1" name=""/>
+        <p:cNvGrpSpPr/>
+        <p:nvPr/>
+      </p:nvGrpSpPr>
+      <p:grpSpPr>
+        <a:xfrm>
+          <a:off x="0" y="0"/>
+          <a:ext cx="0" cy="0"/>
+          <a:chOff x="0" y="0"/>
+          <a:chExt cx="0" cy="0"/>
+        </a:xfrm>
+      </p:grpSpPr>
+      <p:sp>
+        <p:nvSpPr>
+          <p:cNvPr id="2" name="Slide Image Placeholder 1"/>
+          <p:cNvSpPr>
+            <a:spLocks noGrp="1" noRot="1" noChangeAspect="1"/>
+          </p:cNvSpPr>
+          <p:nvPr>
+            <p:ph type="sldImg"/>
+          </p:nvPr>
+        </p:nvSpPr>
+        <p:spPr/>
+      </p:sp>
+      <p:sp>
+        <p:nvSpPr>
+          <p:cNvPr id="3" name="Notes Placeholder 2"/>
+          <p:cNvSpPr>
+            <a:spLocks noGrp="1"/>
+          </p:cNvSpPr>
+          <p:nvPr>
+            <p:ph type="body" idx="1"/>
+          </p:nvPr>
+        </p:nvSpPr>
+        <p:spPr/>
+        <p:txBody>
+          <a:bodyPr/>
+          <a:lstStyle/>
+          <a:p>
+            <a:endParaRPr lang="en-US"/>
+          </a:p>
+        </p:txBody>
+      </p:sp>
+      <p:sp>
+        <p:nvSpPr>
+          <p:cNvPr id="4" name="Slide Number Placeholder 3"/>
+          <p:cNvSpPr>
+            <a:spLocks noGrp="1"/>
+          </p:cNvSpPr>
+          <p:nvPr>
+            <p:ph type="sldNum" sz="quarter" idx="5"/>
+          </p:nvPr>
+        </p:nvSpPr>
+        <p:spPr/>
+        <p:txBody>
+          <a:bodyPr/>
+          <a:lstStyle/>
+          <a:p>
+            <a:fld id="{F90DFFEC-8158-4D22-9DF3-EA2341720A84}" type="slidenum">
+              <a:rPr lang="en-US" smtClean="0"/>
+              <a:t>36</a:t>
+            </a:fld>
+            <a:endParaRPr lang="en-US"/>
+          </a:p>
+        </p:txBody>
+      </p:sp>
+    </p:spTree>
+    <p:extLst>
+      <p:ext uri="{BB962C8B-B14F-4D97-AF65-F5344CB8AC3E}">
+        <p14:creationId xmlns:p14="http://schemas.microsoft.com/office/powerpoint/2010/main" val="2430021049"/>
+      </p:ext>
+    </p:extLst>
+  </p:cSld>
+  <p:clrMapOvr>
+    <a:masterClrMapping/>
+  </p:clrMapOvr>
+</p:notes>
+</file>
+
+<file path=ppt/notesSlides/notesSlide31.xml><?xml version="1.0" encoding="utf-8"?>
+<p:notes xmlns:a="http://schemas.openxmlformats.org/drawingml/2006/main" xmlns:r="http://schemas.openxmlformats.org/officeDocument/2006/relationships" xmlns:p="http://schemas.openxmlformats.org/presentationml/2006/main">
+  <p:cSld>
+    <p:spTree>
+      <p:nvGrpSpPr>
+        <p:cNvPr id="1" name=""/>
+        <p:cNvGrpSpPr/>
+        <p:nvPr/>
+      </p:nvGrpSpPr>
+      <p:grpSpPr>
+        <a:xfrm>
+          <a:off x="0" y="0"/>
+          <a:ext cx="0" cy="0"/>
+          <a:chOff x="0" y="0"/>
+          <a:chExt cx="0" cy="0"/>
+        </a:xfrm>
+      </p:grpSpPr>
+      <p:sp>
+        <p:nvSpPr>
+          <p:cNvPr id="2" name="Slide Image Placeholder 1"/>
+          <p:cNvSpPr>
+            <a:spLocks noGrp="1" noRot="1" noChangeAspect="1"/>
+          </p:cNvSpPr>
+          <p:nvPr>
+            <p:ph type="sldImg"/>
+          </p:nvPr>
+        </p:nvSpPr>
+        <p:spPr/>
+      </p:sp>
+      <p:sp>
+        <p:nvSpPr>
+          <p:cNvPr id="3" name="Notes Placeholder 2"/>
+          <p:cNvSpPr>
+            <a:spLocks noGrp="1"/>
+          </p:cNvSpPr>
+          <p:nvPr>
+            <p:ph type="body" idx="1"/>
+          </p:nvPr>
+        </p:nvSpPr>
+        <p:spPr/>
+        <p:txBody>
+          <a:bodyPr/>
+          <a:lstStyle/>
+          <a:p>
+            <a:endParaRPr lang="en-US"/>
+          </a:p>
+        </p:txBody>
+      </p:sp>
+      <p:sp>
+        <p:nvSpPr>
+          <p:cNvPr id="4" name="Slide Number Placeholder 3"/>
+          <p:cNvSpPr>
+            <a:spLocks noGrp="1"/>
+          </p:cNvSpPr>
+          <p:nvPr>
+            <p:ph type="sldNum" sz="quarter" idx="5"/>
+          </p:nvPr>
+        </p:nvSpPr>
+        <p:spPr/>
+        <p:txBody>
+          <a:bodyPr/>
+          <a:lstStyle/>
+          <a:p>
+            <a:fld id="{F90DFFEC-8158-4D22-9DF3-EA2341720A84}" type="slidenum">
+              <a:rPr lang="en-US" smtClean="0"/>
+              <a:t>37</a:t>
+            </a:fld>
+            <a:endParaRPr lang="en-US"/>
+          </a:p>
+        </p:txBody>
+      </p:sp>
+    </p:spTree>
+    <p:extLst>
+      <p:ext uri="{BB962C8B-B14F-4D97-AF65-F5344CB8AC3E}">
+        <p14:creationId xmlns:p14="http://schemas.microsoft.com/office/powerpoint/2010/main" val="943843433"/>
+      </p:ext>
+    </p:extLst>
+  </p:cSld>
+  <p:clrMapOvr>
+    <a:masterClrMapping/>
+  </p:clrMapOvr>
+</p:notes>
+</file>
+
+<file path=ppt/notesSlides/notesSlide32.xml><?xml version="1.0" encoding="utf-8"?>
+<p:notes xmlns:a="http://schemas.openxmlformats.org/drawingml/2006/main" xmlns:r="http://schemas.openxmlformats.org/officeDocument/2006/relationships" xmlns:p="http://schemas.openxmlformats.org/presentationml/2006/main">
+  <p:cSld>
+    <p:spTree>
+      <p:nvGrpSpPr>
+        <p:cNvPr id="1" name=""/>
+        <p:cNvGrpSpPr/>
+        <p:nvPr/>
+      </p:nvGrpSpPr>
+      <p:grpSpPr>
+        <a:xfrm>
+          <a:off x="0" y="0"/>
+          <a:ext cx="0" cy="0"/>
+          <a:chOff x="0" y="0"/>
+          <a:chExt cx="0" cy="0"/>
+        </a:xfrm>
+      </p:grpSpPr>
+      <p:sp>
+        <p:nvSpPr>
+          <p:cNvPr id="2" name="Slide Image Placeholder 1"/>
+          <p:cNvSpPr>
+            <a:spLocks noGrp="1" noRot="1" noChangeAspect="1"/>
+          </p:cNvSpPr>
+          <p:nvPr>
+            <p:ph type="sldImg"/>
+          </p:nvPr>
+        </p:nvSpPr>
+        <p:spPr/>
+      </p:sp>
+      <p:sp>
+        <p:nvSpPr>
+          <p:cNvPr id="3" name="Notes Placeholder 2"/>
+          <p:cNvSpPr>
+            <a:spLocks noGrp="1"/>
+          </p:cNvSpPr>
+          <p:nvPr>
+            <p:ph type="body" idx="1"/>
+          </p:nvPr>
+        </p:nvSpPr>
+        <p:spPr/>
+        <p:txBody>
+          <a:bodyPr/>
+          <a:lstStyle/>
+          <a:p>
+            <a:endParaRPr lang="en-US"/>
+          </a:p>
+        </p:txBody>
+      </p:sp>
+      <p:sp>
+        <p:nvSpPr>
+          <p:cNvPr id="4" name="Slide Number Placeholder 3"/>
+          <p:cNvSpPr>
+            <a:spLocks noGrp="1"/>
+          </p:cNvSpPr>
+          <p:nvPr>
+            <p:ph type="sldNum" sz="quarter" idx="5"/>
+          </p:nvPr>
+        </p:nvSpPr>
+        <p:spPr/>
+        <p:txBody>
+          <a:bodyPr/>
+          <a:lstStyle/>
+          <a:p>
+            <a:fld id="{F90DFFEC-8158-4D22-9DF3-EA2341720A84}" type="slidenum">
+              <a:rPr lang="en-US" smtClean="0"/>
+              <a:t>38</a:t>
+            </a:fld>
+            <a:endParaRPr lang="en-US"/>
+          </a:p>
+        </p:txBody>
+      </p:sp>
+    </p:spTree>
+    <p:extLst>
+      <p:ext uri="{BB962C8B-B14F-4D97-AF65-F5344CB8AC3E}">
+        <p14:creationId xmlns:p14="http://schemas.microsoft.com/office/powerpoint/2010/main" val="2839959974"/>
+      </p:ext>
+    </p:extLst>
+  </p:cSld>
+  <p:clrMapOvr>
+    <a:masterClrMapping/>
+  </p:clrMapOvr>
+</p:notes>
+</file>
+
+<file path=ppt/notesSlides/notesSlide33.xml><?xml version="1.0" encoding="utf-8"?>
+<p:notes xmlns:a="http://schemas.openxmlformats.org/drawingml/2006/main" xmlns:r="http://schemas.openxmlformats.org/officeDocument/2006/relationships" xmlns:p="http://schemas.openxmlformats.org/presentationml/2006/main">
+  <p:cSld>
+    <p:spTree>
+      <p:nvGrpSpPr>
+        <p:cNvPr id="1" name=""/>
+        <p:cNvGrpSpPr/>
+        <p:nvPr/>
+      </p:nvGrpSpPr>
+      <p:grpSpPr>
+        <a:xfrm>
+          <a:off x="0" y="0"/>
+          <a:ext cx="0" cy="0"/>
+          <a:chOff x="0" y="0"/>
+          <a:chExt cx="0" cy="0"/>
+        </a:xfrm>
+      </p:grpSpPr>
+      <p:sp>
+        <p:nvSpPr>
+          <p:cNvPr id="2" name="Slide Image Placeholder 1"/>
+          <p:cNvSpPr>
+            <a:spLocks noGrp="1" noRot="1" noChangeAspect="1"/>
+          </p:cNvSpPr>
+          <p:nvPr>
+            <p:ph type="sldImg"/>
+          </p:nvPr>
+        </p:nvSpPr>
+        <p:spPr/>
+      </p:sp>
+      <p:sp>
+        <p:nvSpPr>
+          <p:cNvPr id="3" name="Notes Placeholder 2"/>
+          <p:cNvSpPr>
+            <a:spLocks noGrp="1"/>
+          </p:cNvSpPr>
+          <p:nvPr>
+            <p:ph type="body" idx="1"/>
+          </p:nvPr>
+        </p:nvSpPr>
+        <p:spPr/>
+        <p:txBody>
+          <a:bodyPr/>
+          <a:lstStyle/>
+          <a:p>
+            <a:endParaRPr lang="en-US"/>
+          </a:p>
+        </p:txBody>
+      </p:sp>
+      <p:sp>
+        <p:nvSpPr>
+          <p:cNvPr id="4" name="Slide Number Placeholder 3"/>
+          <p:cNvSpPr>
+            <a:spLocks noGrp="1"/>
+          </p:cNvSpPr>
+          <p:nvPr>
+            <p:ph type="sldNum" sz="quarter" idx="5"/>
+          </p:nvPr>
+        </p:nvSpPr>
+        <p:spPr/>
+        <p:txBody>
+          <a:bodyPr/>
+          <a:lstStyle/>
+          <a:p>
+            <a:fld id="{F90DFFEC-8158-4D22-9DF3-EA2341720A84}" type="slidenum">
+              <a:rPr lang="en-US" smtClean="0"/>
+              <a:t>39</a:t>
+            </a:fld>
+            <a:endParaRPr lang="en-US"/>
+          </a:p>
+        </p:txBody>
+      </p:sp>
+    </p:spTree>
+    <p:extLst>
+      <p:ext uri="{BB962C8B-B14F-4D97-AF65-F5344CB8AC3E}">
+        <p14:creationId xmlns:p14="http://schemas.microsoft.com/office/powerpoint/2010/main" val="2625161199"/>
+      </p:ext>
+    </p:extLst>
+  </p:cSld>
+  <p:clrMapOvr>
+    <a:masterClrMapping/>
+  </p:clrMapOvr>
+</p:notes>
+</file>
+
+<file path=ppt/notesSlides/notesSlide34.xml><?xml version="1.0" encoding="utf-8"?>
+<p:notes xmlns:a="http://schemas.openxmlformats.org/drawingml/2006/main" xmlns:r="http://schemas.openxmlformats.org/officeDocument/2006/relationships" xmlns:p="http://schemas.openxmlformats.org/presentationml/2006/main">
+  <p:cSld>
+    <p:spTree>
+      <p:nvGrpSpPr>
+        <p:cNvPr id="1" name=""/>
+        <p:cNvGrpSpPr/>
+        <p:nvPr/>
+      </p:nvGrpSpPr>
+      <p:grpSpPr>
+        <a:xfrm>
+          <a:off x="0" y="0"/>
+          <a:ext cx="0" cy="0"/>
+          <a:chOff x="0" y="0"/>
+          <a:chExt cx="0" cy="0"/>
+        </a:xfrm>
+      </p:grpSpPr>
+      <p:sp>
+        <p:nvSpPr>
+          <p:cNvPr id="2" name="Slide Image Placeholder 1"/>
+          <p:cNvSpPr>
+            <a:spLocks noGrp="1" noRot="1" noChangeAspect="1"/>
+          </p:cNvSpPr>
+          <p:nvPr>
+            <p:ph type="sldImg"/>
+          </p:nvPr>
+        </p:nvSpPr>
+        <p:spPr/>
+      </p:sp>
+      <p:sp>
+        <p:nvSpPr>
+          <p:cNvPr id="3" name="Notes Placeholder 2"/>
+          <p:cNvSpPr>
+            <a:spLocks noGrp="1"/>
+          </p:cNvSpPr>
+          <p:nvPr>
+            <p:ph type="body" idx="1"/>
+          </p:nvPr>
+        </p:nvSpPr>
+        <p:spPr/>
+        <p:txBody>
+          <a:bodyPr/>
+          <a:lstStyle/>
+          <a:p>
+            <a:endParaRPr lang="en-US"/>
+          </a:p>
+        </p:txBody>
+      </p:sp>
+      <p:sp>
+        <p:nvSpPr>
+          <p:cNvPr id="4" name="Slide Number Placeholder 3"/>
+          <p:cNvSpPr>
+            <a:spLocks noGrp="1"/>
+          </p:cNvSpPr>
+          <p:nvPr>
+            <p:ph type="sldNum" sz="quarter" idx="5"/>
+          </p:nvPr>
+        </p:nvSpPr>
+        <p:spPr/>
+        <p:txBody>
+          <a:bodyPr/>
+          <a:lstStyle/>
+          <a:p>
+            <a:fld id="{F90DFFEC-8158-4D22-9DF3-EA2341720A84}" type="slidenum">
+              <a:rPr lang="en-US" smtClean="0"/>
+              <a:t>40</a:t>
+            </a:fld>
+            <a:endParaRPr lang="en-US"/>
+          </a:p>
+        </p:txBody>
+      </p:sp>
+    </p:spTree>
+    <p:extLst>
+      <p:ext uri="{BB962C8B-B14F-4D97-AF65-F5344CB8AC3E}">
+        <p14:creationId xmlns:p14="http://schemas.microsoft.com/office/powerpoint/2010/main" val="2317006494"/>
+      </p:ext>
+    </p:extLst>
+  </p:cSld>
+  <p:clrMapOvr>
+    <a:masterClrMapping/>
+  </p:clrMapOvr>
+</p:notes>
+</file>
+
+<file path=ppt/notesSlides/notesSlide35.xml><?xml version="1.0" encoding="utf-8"?>
+<p:notes xmlns:a="http://schemas.openxmlformats.org/drawingml/2006/main" xmlns:r="http://schemas.openxmlformats.org/officeDocument/2006/relationships" xmlns:p="http://schemas.openxmlformats.org/presentationml/2006/main">
+  <p:cSld>
+    <p:spTree>
+      <p:nvGrpSpPr>
+        <p:cNvPr id="1" name=""/>
+        <p:cNvGrpSpPr/>
+        <p:nvPr/>
+      </p:nvGrpSpPr>
+      <p:grpSpPr>
+        <a:xfrm>
+          <a:off x="0" y="0"/>
+          <a:ext cx="0" cy="0"/>
+          <a:chOff x="0" y="0"/>
+          <a:chExt cx="0" cy="0"/>
+        </a:xfrm>
+      </p:grpSpPr>
+      <p:sp>
+        <p:nvSpPr>
+          <p:cNvPr id="2" name="Slide Image Placeholder 1"/>
+          <p:cNvSpPr>
+            <a:spLocks noGrp="1" noRot="1" noChangeAspect="1"/>
+          </p:cNvSpPr>
+          <p:nvPr>
+            <p:ph type="sldImg"/>
+          </p:nvPr>
+        </p:nvSpPr>
+        <p:spPr/>
+      </p:sp>
+      <p:sp>
+        <p:nvSpPr>
+          <p:cNvPr id="3" name="Notes Placeholder 2"/>
+          <p:cNvSpPr>
+            <a:spLocks noGrp="1"/>
+          </p:cNvSpPr>
+          <p:nvPr>
+            <p:ph type="body" idx="1"/>
+          </p:nvPr>
+        </p:nvSpPr>
+        <p:spPr/>
+        <p:txBody>
+          <a:bodyPr/>
+          <a:lstStyle/>
+          <a:p>
+            <a:endParaRPr lang="en-US"/>
+          </a:p>
+        </p:txBody>
+      </p:sp>
+      <p:sp>
+        <p:nvSpPr>
+          <p:cNvPr id="4" name="Slide Number Placeholder 3"/>
+          <p:cNvSpPr>
+            <a:spLocks noGrp="1"/>
+          </p:cNvSpPr>
+          <p:nvPr>
+            <p:ph type="sldNum" sz="quarter" idx="5"/>
+          </p:nvPr>
+        </p:nvSpPr>
+        <p:spPr/>
+        <p:txBody>
+          <a:bodyPr/>
+          <a:lstStyle/>
+          <a:p>
+            <a:fld id="{F90DFFEC-8158-4D22-9DF3-EA2341720A84}" type="slidenum">
+              <a:rPr lang="en-US" smtClean="0"/>
+              <a:t>41</a:t>
+            </a:fld>
+            <a:endParaRPr lang="en-US"/>
+          </a:p>
+        </p:txBody>
+      </p:sp>
+    </p:spTree>
+    <p:extLst>
+      <p:ext uri="{BB962C8B-B14F-4D97-AF65-F5344CB8AC3E}">
+        <p14:creationId xmlns:p14="http://schemas.microsoft.com/office/powerpoint/2010/main" val="3627589050"/>
+      </p:ext>
+    </p:extLst>
+  </p:cSld>
+  <p:clrMapOvr>
+    <a:masterClrMapping/>
+  </p:clrMapOvr>
+</p:notes>
+</file>
+
+<file path=ppt/notesSlides/notesSlide36.xml><?xml version="1.0" encoding="utf-8"?>
+<p:notes xmlns:a="http://schemas.openxmlformats.org/drawingml/2006/main" xmlns:r="http://schemas.openxmlformats.org/officeDocument/2006/relationships" xmlns:p="http://schemas.openxmlformats.org/presentationml/2006/main">
+  <p:cSld>
+    <p:spTree>
+      <p:nvGrpSpPr>
+        <p:cNvPr id="1" name=""/>
+        <p:cNvGrpSpPr/>
+        <p:nvPr/>
+      </p:nvGrpSpPr>
+      <p:grpSpPr>
+        <a:xfrm>
+          <a:off x="0" y="0"/>
+          <a:ext cx="0" cy="0"/>
+          <a:chOff x="0" y="0"/>
+          <a:chExt cx="0" cy="0"/>
+        </a:xfrm>
+      </p:grpSpPr>
+      <p:sp>
+        <p:nvSpPr>
+          <p:cNvPr id="2" name="Slide Image Placeholder 1"/>
+          <p:cNvSpPr>
+            <a:spLocks noGrp="1" noRot="1" noChangeAspect="1"/>
+          </p:cNvSpPr>
+          <p:nvPr>
+            <p:ph type="sldImg"/>
+          </p:nvPr>
+        </p:nvSpPr>
+        <p:spPr/>
+      </p:sp>
+      <p:sp>
+        <p:nvSpPr>
+          <p:cNvPr id="3" name="Notes Placeholder 2"/>
+          <p:cNvSpPr>
+            <a:spLocks noGrp="1"/>
+          </p:cNvSpPr>
+          <p:nvPr>
+            <p:ph type="body" idx="1"/>
+          </p:nvPr>
+        </p:nvSpPr>
+        <p:spPr/>
+        <p:txBody>
+          <a:bodyPr/>
+          <a:lstStyle/>
+          <a:p>
+            <a:endParaRPr lang="en-US"/>
+          </a:p>
+        </p:txBody>
+      </p:sp>
+      <p:sp>
+        <p:nvSpPr>
+          <p:cNvPr id="4" name="Slide Number Placeholder 3"/>
+          <p:cNvSpPr>
+            <a:spLocks noGrp="1"/>
+          </p:cNvSpPr>
+          <p:nvPr>
+            <p:ph type="sldNum" sz="quarter" idx="5"/>
+          </p:nvPr>
+        </p:nvSpPr>
+        <p:spPr/>
+        <p:txBody>
+          <a:bodyPr/>
+          <a:lstStyle/>
+          <a:p>
+            <a:fld id="{F90DFFEC-8158-4D22-9DF3-EA2341720A84}" type="slidenum">
+              <a:rPr lang="en-US" smtClean="0"/>
+              <a:t>42</a:t>
+            </a:fld>
+            <a:endParaRPr lang="en-US"/>
+          </a:p>
+        </p:txBody>
+      </p:sp>
+    </p:spTree>
+    <p:extLst>
+      <p:ext uri="{BB962C8B-B14F-4D97-AF65-F5344CB8AC3E}">
+        <p14:creationId xmlns:p14="http://schemas.microsoft.com/office/powerpoint/2010/main" val="491827066"/>
+      </p:ext>
+    </p:extLst>
+  </p:cSld>
+  <p:clrMapOvr>
+    <a:masterClrMapping/>
+  </p:clrMapOvr>
+</p:notes>
+</file>
+
 <file path=ppt/notesSlides/notesSlide4.xml><?xml version="1.0" encoding="utf-8"?>
 <p:notes xmlns:a="http://schemas.openxmlformats.org/drawingml/2006/main" xmlns:r="http://schemas.openxmlformats.org/officeDocument/2006/relationships" xmlns:p="http://schemas.openxmlformats.org/presentationml/2006/main">
   <p:cSld>
@@ -1989,7 +3102,7 @@
     </p:spTree>
     <p:extLst>
       <p:ext uri="{BB962C8B-B14F-4D97-AF65-F5344CB8AC3E}">
-        <p14:creationId xmlns:p14="http://schemas.microsoft.com/office/powerpoint/2010/main" val="1703869654"/>
+        <p14:creationId xmlns:p14="http://schemas.microsoft.com/office/powerpoint/2010/main" val="303499729"/>
       </p:ext>
     </p:extLst>
   </p:cSld>
@@ -2073,7 +3186,7 @@
     </p:spTree>
     <p:extLst>
       <p:ext uri="{BB962C8B-B14F-4D97-AF65-F5344CB8AC3E}">
-        <p14:creationId xmlns:p14="http://schemas.microsoft.com/office/powerpoint/2010/main" val="2347904411"/>
+        <p14:creationId xmlns:p14="http://schemas.microsoft.com/office/powerpoint/2010/main" val="783329589"/>
       </p:ext>
     </p:extLst>
   </p:cSld>
@@ -2157,7 +3270,7 @@
     </p:spTree>
     <p:extLst>
       <p:ext uri="{BB962C8B-B14F-4D97-AF65-F5344CB8AC3E}">
-        <p14:creationId xmlns:p14="http://schemas.microsoft.com/office/powerpoint/2010/main" val="1078777090"/>
+        <p14:creationId xmlns:p14="http://schemas.microsoft.com/office/powerpoint/2010/main" val="1703869654"/>
       </p:ext>
     </p:extLst>
   </p:cSld>
@@ -2241,7 +3354,7 @@
     </p:spTree>
     <p:extLst>
       <p:ext uri="{BB962C8B-B14F-4D97-AF65-F5344CB8AC3E}">
-        <p14:creationId xmlns:p14="http://schemas.microsoft.com/office/powerpoint/2010/main" val="4032800092"/>
+        <p14:creationId xmlns:p14="http://schemas.microsoft.com/office/powerpoint/2010/main" val="2347904411"/>
       </p:ext>
     </p:extLst>
   </p:cSld>
@@ -2325,7 +3438,7 @@
     </p:spTree>
     <p:extLst>
       <p:ext uri="{BB962C8B-B14F-4D97-AF65-F5344CB8AC3E}">
-        <p14:creationId xmlns:p14="http://schemas.microsoft.com/office/powerpoint/2010/main" val="4205124079"/>
+        <p14:creationId xmlns:p14="http://schemas.microsoft.com/office/powerpoint/2010/main" val="1078777090"/>
       </p:ext>
     </p:extLst>
   </p:cSld>
@@ -2409,7 +3522,7 @@
     </p:spTree>
     <p:extLst>
       <p:ext uri="{BB962C8B-B14F-4D97-AF65-F5344CB8AC3E}">
-        <p14:creationId xmlns:p14="http://schemas.microsoft.com/office/powerpoint/2010/main" val="937946380"/>
+        <p14:creationId xmlns:p14="http://schemas.microsoft.com/office/powerpoint/2010/main" val="4032800092"/>
       </p:ext>
     </p:extLst>
   </p:cSld>
@@ -2566,7 +3679,7 @@
           <a:p>
             <a:fld id="{5B85E33B-8D9F-477B-8110-71DF01F111B9}" type="datetimeFigureOut">
               <a:rPr lang="en-US" smtClean="0"/>
-              <a:t>11/20/2019</a:t>
+              <a:t>11/22/2019</a:t>
             </a:fld>
             <a:endParaRPr lang="en-US"/>
           </a:p>
@@ -2764,7 +3877,7 @@
           <a:p>
             <a:fld id="{5B85E33B-8D9F-477B-8110-71DF01F111B9}" type="datetimeFigureOut">
               <a:rPr lang="en-US" smtClean="0"/>
-              <a:t>11/20/2019</a:t>
+              <a:t>11/22/2019</a:t>
             </a:fld>
             <a:endParaRPr lang="en-US"/>
           </a:p>
@@ -2972,7 +4085,7 @@
           <a:p>
             <a:fld id="{5B85E33B-8D9F-477B-8110-71DF01F111B9}" type="datetimeFigureOut">
               <a:rPr lang="en-US" smtClean="0"/>
-              <a:t>11/20/2019</a:t>
+              <a:t>11/22/2019</a:t>
             </a:fld>
             <a:endParaRPr lang="en-US"/>
           </a:p>
@@ -3170,7 +4283,7 @@
           <a:p>
             <a:fld id="{5B85E33B-8D9F-477B-8110-71DF01F111B9}" type="datetimeFigureOut">
               <a:rPr lang="en-US" smtClean="0"/>
-              <a:t>11/20/2019</a:t>
+              <a:t>11/22/2019</a:t>
             </a:fld>
             <a:endParaRPr lang="en-US"/>
           </a:p>
@@ -3445,7 +4558,7 @@
           <a:p>
             <a:fld id="{5B85E33B-8D9F-477B-8110-71DF01F111B9}" type="datetimeFigureOut">
               <a:rPr lang="en-US" smtClean="0"/>
-              <a:t>11/20/2019</a:t>
+              <a:t>11/22/2019</a:t>
             </a:fld>
             <a:endParaRPr lang="en-US"/>
           </a:p>
@@ -3710,7 +4823,7 @@
           <a:p>
             <a:fld id="{5B85E33B-8D9F-477B-8110-71DF01F111B9}" type="datetimeFigureOut">
               <a:rPr lang="en-US" smtClean="0"/>
-              <a:t>11/20/2019</a:t>
+              <a:t>11/22/2019</a:t>
             </a:fld>
             <a:endParaRPr lang="en-US"/>
           </a:p>
@@ -4122,7 +5235,7 @@
           <a:p>
             <a:fld id="{5B85E33B-8D9F-477B-8110-71DF01F111B9}" type="datetimeFigureOut">
               <a:rPr lang="en-US" smtClean="0"/>
-              <a:t>11/20/2019</a:t>
+              <a:t>11/22/2019</a:t>
             </a:fld>
             <a:endParaRPr lang="en-US"/>
           </a:p>
@@ -4263,7 +5376,7 @@
           <a:p>
             <a:fld id="{5B85E33B-8D9F-477B-8110-71DF01F111B9}" type="datetimeFigureOut">
               <a:rPr lang="en-US" smtClean="0"/>
-              <a:t>11/20/2019</a:t>
+              <a:t>11/22/2019</a:t>
             </a:fld>
             <a:endParaRPr lang="en-US"/>
           </a:p>
@@ -4376,7 +5489,7 @@
           <a:p>
             <a:fld id="{5B85E33B-8D9F-477B-8110-71DF01F111B9}" type="datetimeFigureOut">
               <a:rPr lang="en-US" smtClean="0"/>
-              <a:t>11/20/2019</a:t>
+              <a:t>11/22/2019</a:t>
             </a:fld>
             <a:endParaRPr lang="en-US"/>
           </a:p>
@@ -4687,7 +5800,7 @@
           <a:p>
             <a:fld id="{5B85E33B-8D9F-477B-8110-71DF01F111B9}" type="datetimeFigureOut">
               <a:rPr lang="en-US" smtClean="0"/>
-              <a:t>11/20/2019</a:t>
+              <a:t>11/22/2019</a:t>
             </a:fld>
             <a:endParaRPr lang="en-US"/>
           </a:p>
@@ -4975,7 +6088,7 @@
           <a:p>
             <a:fld id="{5B85E33B-8D9F-477B-8110-71DF01F111B9}" type="datetimeFigureOut">
               <a:rPr lang="en-US" smtClean="0"/>
-              <a:t>11/20/2019</a:t>
+              <a:t>11/22/2019</a:t>
             </a:fld>
             <a:endParaRPr lang="en-US"/>
           </a:p>
@@ -5216,7 +6329,7 @@
           <a:p>
             <a:fld id="{5B85E33B-8D9F-477B-8110-71DF01F111B9}" type="datetimeFigureOut">
               <a:rPr lang="en-US" smtClean="0"/>
-              <a:t>11/20/2019</a:t>
+              <a:t>11/22/2019</a:t>
             </a:fld>
             <a:endParaRPr lang="en-US"/>
           </a:p>
@@ -5695,6 +6808,126 @@
       </p:grpSpPr>
       <p:pic>
         <p:nvPicPr>
+          <p:cNvPr id="3" name="Picture 2">
+            <a:extLst>
+              <a:ext uri="{FF2B5EF4-FFF2-40B4-BE49-F238E27FC236}">
+                <a16:creationId xmlns:a16="http://schemas.microsoft.com/office/drawing/2014/main" id="{A48DAA00-5AD2-421E-B256-4983A30B4B7A}"/>
+              </a:ext>
+            </a:extLst>
+          </p:cNvPr>
+          <p:cNvPicPr>
+            <a:picLocks noChangeAspect="1"/>
+          </p:cNvPicPr>
+          <p:nvPr/>
+        </p:nvPicPr>
+        <p:blipFill>
+          <a:blip r:embed="rId3"/>
+          <a:stretch>
+            <a:fillRect/>
+          </a:stretch>
+        </p:blipFill>
+        <p:spPr>
+          <a:xfrm>
+            <a:off x="1513689" y="0"/>
+            <a:ext cx="9164621" cy="6858000"/>
+          </a:xfrm>
+          <a:prstGeom prst="rect">
+            <a:avLst/>
+          </a:prstGeom>
+        </p:spPr>
+      </p:pic>
+    </p:spTree>
+    <p:extLst>
+      <p:ext uri="{BB962C8B-B14F-4D97-AF65-F5344CB8AC3E}">
+        <p14:creationId xmlns:p14="http://schemas.microsoft.com/office/powerpoint/2010/main" val="300121716"/>
+      </p:ext>
+    </p:extLst>
+  </p:cSld>
+  <p:clrMapOvr>
+    <a:masterClrMapping/>
+  </p:clrMapOvr>
+</p:sld>
+</file>
+
+<file path=ppt/slides/slide11.xml><?xml version="1.0" encoding="utf-8"?>
+<p:sld xmlns:a="http://schemas.openxmlformats.org/drawingml/2006/main" xmlns:r="http://schemas.openxmlformats.org/officeDocument/2006/relationships" xmlns:p="http://schemas.openxmlformats.org/presentationml/2006/main">
+  <p:cSld>
+    <p:spTree>
+      <p:nvGrpSpPr>
+        <p:cNvPr id="1" name=""/>
+        <p:cNvGrpSpPr/>
+        <p:nvPr/>
+      </p:nvGrpSpPr>
+      <p:grpSpPr>
+        <a:xfrm>
+          <a:off x="0" y="0"/>
+          <a:ext cx="0" cy="0"/>
+          <a:chOff x="0" y="0"/>
+          <a:chExt cx="0" cy="0"/>
+        </a:xfrm>
+      </p:grpSpPr>
+      <p:pic>
+        <p:nvPicPr>
+          <p:cNvPr id="2" name="Picture 1">
+            <a:extLst>
+              <a:ext uri="{FF2B5EF4-FFF2-40B4-BE49-F238E27FC236}">
+                <a16:creationId xmlns:a16="http://schemas.microsoft.com/office/drawing/2014/main" id="{94310230-8F38-4355-8D53-99402DAE3897}"/>
+              </a:ext>
+            </a:extLst>
+          </p:cNvPr>
+          <p:cNvPicPr>
+            <a:picLocks noChangeAspect="1"/>
+          </p:cNvPicPr>
+          <p:nvPr/>
+        </p:nvPicPr>
+        <p:blipFill>
+          <a:blip r:embed="rId3"/>
+          <a:stretch>
+            <a:fillRect/>
+          </a:stretch>
+        </p:blipFill>
+        <p:spPr>
+          <a:xfrm>
+            <a:off x="1772690" y="292893"/>
+            <a:ext cx="8646619" cy="6272213"/>
+          </a:xfrm>
+          <a:prstGeom prst="rect">
+            <a:avLst/>
+          </a:prstGeom>
+        </p:spPr>
+      </p:pic>
+    </p:spTree>
+    <p:extLst>
+      <p:ext uri="{BB962C8B-B14F-4D97-AF65-F5344CB8AC3E}">
+        <p14:creationId xmlns:p14="http://schemas.microsoft.com/office/powerpoint/2010/main" val="3410017720"/>
+      </p:ext>
+    </p:extLst>
+  </p:cSld>
+  <p:clrMapOvr>
+    <a:masterClrMapping/>
+  </p:clrMapOvr>
+</p:sld>
+</file>
+
+<file path=ppt/slides/slide12.xml><?xml version="1.0" encoding="utf-8"?>
+<p:sld xmlns:a="http://schemas.openxmlformats.org/drawingml/2006/main" xmlns:r="http://schemas.openxmlformats.org/officeDocument/2006/relationships" xmlns:p="http://schemas.openxmlformats.org/presentationml/2006/main">
+  <p:cSld>
+    <p:spTree>
+      <p:nvGrpSpPr>
+        <p:cNvPr id="1" name=""/>
+        <p:cNvGrpSpPr/>
+        <p:nvPr/>
+      </p:nvGrpSpPr>
+      <p:grpSpPr>
+        <a:xfrm>
+          <a:off x="0" y="0"/>
+          <a:ext cx="0" cy="0"/>
+          <a:chOff x="0" y="0"/>
+          <a:chExt cx="0" cy="0"/>
+        </a:xfrm>
+      </p:grpSpPr>
+      <p:pic>
+        <p:nvPicPr>
           <p:cNvPr id="2" name="Picture 1">
             <a:extLst>
               <a:ext uri="{FF2B5EF4-FFF2-40B4-BE49-F238E27FC236}">
@@ -5736,7 +6969,7 @@
 </p:sld>
 </file>
 
-<file path=ppt/slides/slide11.xml><?xml version="1.0" encoding="utf-8"?>
+<file path=ppt/slides/slide13.xml><?xml version="1.0" encoding="utf-8"?>
 <p:sld xmlns:a="http://schemas.openxmlformats.org/drawingml/2006/main" xmlns:r="http://schemas.openxmlformats.org/officeDocument/2006/relationships" xmlns:p="http://schemas.openxmlformats.org/presentationml/2006/main">
   <p:cSld>
     <p:spTree>
@@ -5796,7 +7029,7 @@
 </p:sld>
 </file>
 
-<file path=ppt/slides/slide12.xml><?xml version="1.0" encoding="utf-8"?>
+<file path=ppt/slides/slide14.xml><?xml version="1.0" encoding="utf-8"?>
 <p:sld xmlns:a="http://schemas.openxmlformats.org/drawingml/2006/main" xmlns:r="http://schemas.openxmlformats.org/officeDocument/2006/relationships" xmlns:p="http://schemas.openxmlformats.org/presentationml/2006/main">
   <p:cSld>
     <p:spTree>
@@ -5856,7 +7089,7 @@
 </p:sld>
 </file>
 
-<file path=ppt/slides/slide13.xml><?xml version="1.0" encoding="utf-8"?>
+<file path=ppt/slides/slide15.xml><?xml version="1.0" encoding="utf-8"?>
 <p:sld xmlns:a="http://schemas.openxmlformats.org/drawingml/2006/main" xmlns:r="http://schemas.openxmlformats.org/officeDocument/2006/relationships" xmlns:p="http://schemas.openxmlformats.org/presentationml/2006/main">
   <p:cSld>
     <p:spTree>
@@ -5916,7 +7149,7 @@
 </p:sld>
 </file>
 
-<file path=ppt/slides/slide14.xml><?xml version="1.0" encoding="utf-8"?>
+<file path=ppt/slides/slide16.xml><?xml version="1.0" encoding="utf-8"?>
 <p:sld xmlns:a="http://schemas.openxmlformats.org/drawingml/2006/main" xmlns:r="http://schemas.openxmlformats.org/officeDocument/2006/relationships" xmlns:p="http://schemas.openxmlformats.org/presentationml/2006/main">
   <p:cSld>
     <p:spTree>
@@ -5976,7 +7209,7 @@
 </p:sld>
 </file>
 
-<file path=ppt/slides/slide15.xml><?xml version="1.0" encoding="utf-8"?>
+<file path=ppt/slides/slide17.xml><?xml version="1.0" encoding="utf-8"?>
 <p:sld xmlns:a="http://schemas.openxmlformats.org/drawingml/2006/main" xmlns:r="http://schemas.openxmlformats.org/officeDocument/2006/relationships" xmlns:p="http://schemas.openxmlformats.org/presentationml/2006/main">
   <p:cSld>
     <p:spTree>
@@ -6036,7 +7269,7 @@
 </p:sld>
 </file>
 
-<file path=ppt/slides/slide16.xml><?xml version="1.0" encoding="utf-8"?>
+<file path=ppt/slides/slide18.xml><?xml version="1.0" encoding="utf-8"?>
 <p:sld xmlns:a="http://schemas.openxmlformats.org/drawingml/2006/main" xmlns:r="http://schemas.openxmlformats.org/officeDocument/2006/relationships" xmlns:p="http://schemas.openxmlformats.org/presentationml/2006/main">
   <p:cSld>
     <p:spTree>
@@ -6096,7 +7329,7 @@
 </p:sld>
 </file>
 
-<file path=ppt/slides/slide17.xml><?xml version="1.0" encoding="utf-8"?>
+<file path=ppt/slides/slide19.xml><?xml version="1.0" encoding="utf-8"?>
 <p:sld xmlns:a="http://schemas.openxmlformats.org/drawingml/2006/main" xmlns:r="http://schemas.openxmlformats.org/officeDocument/2006/relationships" xmlns:p="http://schemas.openxmlformats.org/presentationml/2006/main">
   <p:cSld>
     <p:spTree>
@@ -6147,126 +7380,6 @@
     <p:extLst>
       <p:ext uri="{BB962C8B-B14F-4D97-AF65-F5344CB8AC3E}">
         <p14:creationId xmlns:p14="http://schemas.microsoft.com/office/powerpoint/2010/main" val="2041872002"/>
-      </p:ext>
-    </p:extLst>
-  </p:cSld>
-  <p:clrMapOvr>
-    <a:masterClrMapping/>
-  </p:clrMapOvr>
-</p:sld>
-</file>
-
-<file path=ppt/slides/slide18.xml><?xml version="1.0" encoding="utf-8"?>
-<p:sld xmlns:a="http://schemas.openxmlformats.org/drawingml/2006/main" xmlns:r="http://schemas.openxmlformats.org/officeDocument/2006/relationships" xmlns:p="http://schemas.openxmlformats.org/presentationml/2006/main">
-  <p:cSld>
-    <p:spTree>
-      <p:nvGrpSpPr>
-        <p:cNvPr id="1" name=""/>
-        <p:cNvGrpSpPr/>
-        <p:nvPr/>
-      </p:nvGrpSpPr>
-      <p:grpSpPr>
-        <a:xfrm>
-          <a:off x="0" y="0"/>
-          <a:ext cx="0" cy="0"/>
-          <a:chOff x="0" y="0"/>
-          <a:chExt cx="0" cy="0"/>
-        </a:xfrm>
-      </p:grpSpPr>
-      <p:pic>
-        <p:nvPicPr>
-          <p:cNvPr id="2" name="Picture 1">
-            <a:extLst>
-              <a:ext uri="{FF2B5EF4-FFF2-40B4-BE49-F238E27FC236}">
-                <a16:creationId xmlns:a16="http://schemas.microsoft.com/office/drawing/2014/main" id="{CC6FF5C6-E418-4AFD-BDE4-A09626CDF4C7}"/>
-              </a:ext>
-            </a:extLst>
-          </p:cNvPr>
-          <p:cNvPicPr>
-            <a:picLocks noChangeAspect="1"/>
-          </p:cNvPicPr>
-          <p:nvPr/>
-        </p:nvPicPr>
-        <p:blipFill>
-          <a:blip r:embed="rId3"/>
-          <a:stretch>
-            <a:fillRect/>
-          </a:stretch>
-        </p:blipFill>
-        <p:spPr>
-          <a:xfrm>
-            <a:off x="1384966" y="0"/>
-            <a:ext cx="9422067" cy="6858000"/>
-          </a:xfrm>
-          <a:prstGeom prst="rect">
-            <a:avLst/>
-          </a:prstGeom>
-        </p:spPr>
-      </p:pic>
-    </p:spTree>
-    <p:extLst>
-      <p:ext uri="{BB962C8B-B14F-4D97-AF65-F5344CB8AC3E}">
-        <p14:creationId xmlns:p14="http://schemas.microsoft.com/office/powerpoint/2010/main" val="2586640205"/>
-      </p:ext>
-    </p:extLst>
-  </p:cSld>
-  <p:clrMapOvr>
-    <a:masterClrMapping/>
-  </p:clrMapOvr>
-</p:sld>
-</file>
-
-<file path=ppt/slides/slide19.xml><?xml version="1.0" encoding="utf-8"?>
-<p:sld xmlns:a="http://schemas.openxmlformats.org/drawingml/2006/main" xmlns:r="http://schemas.openxmlformats.org/officeDocument/2006/relationships" xmlns:p="http://schemas.openxmlformats.org/presentationml/2006/main">
-  <p:cSld>
-    <p:spTree>
-      <p:nvGrpSpPr>
-        <p:cNvPr id="1" name=""/>
-        <p:cNvGrpSpPr/>
-        <p:nvPr/>
-      </p:nvGrpSpPr>
-      <p:grpSpPr>
-        <a:xfrm>
-          <a:off x="0" y="0"/>
-          <a:ext cx="0" cy="0"/>
-          <a:chOff x="0" y="0"/>
-          <a:chExt cx="0" cy="0"/>
-        </a:xfrm>
-      </p:grpSpPr>
-      <p:pic>
-        <p:nvPicPr>
-          <p:cNvPr id="2" name="Picture 1">
-            <a:extLst>
-              <a:ext uri="{FF2B5EF4-FFF2-40B4-BE49-F238E27FC236}">
-                <a16:creationId xmlns:a16="http://schemas.microsoft.com/office/drawing/2014/main" id="{F5D70DDE-DA9C-4D8D-B67F-E6AC700A0152}"/>
-              </a:ext>
-            </a:extLst>
-          </p:cNvPr>
-          <p:cNvPicPr>
-            <a:picLocks noChangeAspect="1"/>
-          </p:cNvPicPr>
-          <p:nvPr/>
-        </p:nvPicPr>
-        <p:blipFill>
-          <a:blip r:embed="rId3"/>
-          <a:stretch>
-            <a:fillRect/>
-          </a:stretch>
-        </p:blipFill>
-        <p:spPr>
-          <a:xfrm>
-            <a:off x="1656835" y="0"/>
-            <a:ext cx="8878330" cy="6858000"/>
-          </a:xfrm>
-          <a:prstGeom prst="rect">
-            <a:avLst/>
-          </a:prstGeom>
-        </p:spPr>
-      </p:pic>
-    </p:spTree>
-    <p:extLst>
-      <p:ext uri="{BB962C8B-B14F-4D97-AF65-F5344CB8AC3E}">
-        <p14:creationId xmlns:p14="http://schemas.microsoft.com/office/powerpoint/2010/main" val="3797565741"/>
       </p:ext>
     </p:extLst>
   </p:cSld>
@@ -6515,7 +7628,7 @@
           <p:cNvPr id="2" name="Picture 1">
             <a:extLst>
               <a:ext uri="{FF2B5EF4-FFF2-40B4-BE49-F238E27FC236}">
-                <a16:creationId xmlns:a16="http://schemas.microsoft.com/office/drawing/2014/main" id="{0CE54B66-4FAA-4C8E-A436-7FD1A34C4B98}"/>
+                <a16:creationId xmlns:a16="http://schemas.microsoft.com/office/drawing/2014/main" id="{CC6FF5C6-E418-4AFD-BDE4-A09626CDF4C7}"/>
               </a:ext>
             </a:extLst>
           </p:cNvPr>
@@ -6532,8 +7645,278 @@
         </p:blipFill>
         <p:spPr>
           <a:xfrm>
-            <a:off x="2514100" y="699706"/>
-            <a:ext cx="7163800" cy="5458587"/>
+            <a:off x="1384966" y="0"/>
+            <a:ext cx="9422067" cy="6858000"/>
+          </a:xfrm>
+          <a:prstGeom prst="rect">
+            <a:avLst/>
+          </a:prstGeom>
+        </p:spPr>
+      </p:pic>
+    </p:spTree>
+    <p:extLst>
+      <p:ext uri="{BB962C8B-B14F-4D97-AF65-F5344CB8AC3E}">
+        <p14:creationId xmlns:p14="http://schemas.microsoft.com/office/powerpoint/2010/main" val="2586640205"/>
+      </p:ext>
+    </p:extLst>
+  </p:cSld>
+  <p:clrMapOvr>
+    <a:masterClrMapping/>
+  </p:clrMapOvr>
+</p:sld>
+</file>
+
+<file path=ppt/slides/slide21.xml><?xml version="1.0" encoding="utf-8"?>
+<p:sld xmlns:a="http://schemas.openxmlformats.org/drawingml/2006/main" xmlns:r="http://schemas.openxmlformats.org/officeDocument/2006/relationships" xmlns:p="http://schemas.openxmlformats.org/presentationml/2006/main">
+  <p:cSld>
+    <p:spTree>
+      <p:nvGrpSpPr>
+        <p:cNvPr id="1" name=""/>
+        <p:cNvGrpSpPr/>
+        <p:nvPr/>
+      </p:nvGrpSpPr>
+      <p:grpSpPr>
+        <a:xfrm>
+          <a:off x="0" y="0"/>
+          <a:ext cx="0" cy="0"/>
+          <a:chOff x="0" y="0"/>
+          <a:chExt cx="0" cy="0"/>
+        </a:xfrm>
+      </p:grpSpPr>
+      <p:pic>
+        <p:nvPicPr>
+          <p:cNvPr id="2" name="Picture 1">
+            <a:extLst>
+              <a:ext uri="{FF2B5EF4-FFF2-40B4-BE49-F238E27FC236}">
+                <a16:creationId xmlns:a16="http://schemas.microsoft.com/office/drawing/2014/main" id="{D8FA9885-ABD9-4E0B-81ED-32BE46C29656}"/>
+              </a:ext>
+            </a:extLst>
+          </p:cNvPr>
+          <p:cNvPicPr>
+            <a:picLocks noChangeAspect="1"/>
+          </p:cNvPicPr>
+          <p:nvPr/>
+        </p:nvPicPr>
+        <p:blipFill>
+          <a:blip r:embed="rId3"/>
+          <a:stretch>
+            <a:fillRect/>
+          </a:stretch>
+        </p:blipFill>
+        <p:spPr>
+          <a:xfrm>
+            <a:off x="1532860" y="0"/>
+            <a:ext cx="9126279" cy="6858000"/>
+          </a:xfrm>
+          <a:prstGeom prst="rect">
+            <a:avLst/>
+          </a:prstGeom>
+        </p:spPr>
+      </p:pic>
+      <p:pic>
+        <p:nvPicPr>
+          <p:cNvPr id="4" name="Picture 3">
+            <a:extLst>
+              <a:ext uri="{FF2B5EF4-FFF2-40B4-BE49-F238E27FC236}">
+                <a16:creationId xmlns:a16="http://schemas.microsoft.com/office/drawing/2014/main" id="{000429BD-9565-47A8-9F1B-94AD98566300}"/>
+              </a:ext>
+            </a:extLst>
+          </p:cNvPr>
+          <p:cNvPicPr>
+            <a:picLocks noChangeAspect="1"/>
+          </p:cNvPicPr>
+          <p:nvPr/>
+        </p:nvPicPr>
+        <p:blipFill>
+          <a:blip r:embed="rId4"/>
+          <a:stretch>
+            <a:fillRect/>
+          </a:stretch>
+        </p:blipFill>
+        <p:spPr>
+          <a:xfrm>
+            <a:off x="2020887" y="4889500"/>
+            <a:ext cx="5168995" cy="914987"/>
+          </a:xfrm>
+          <a:prstGeom prst="rect">
+            <a:avLst/>
+          </a:prstGeom>
+        </p:spPr>
+      </p:pic>
+    </p:spTree>
+    <p:extLst>
+      <p:ext uri="{BB962C8B-B14F-4D97-AF65-F5344CB8AC3E}">
+        <p14:creationId xmlns:p14="http://schemas.microsoft.com/office/powerpoint/2010/main" val="2817322964"/>
+      </p:ext>
+    </p:extLst>
+  </p:cSld>
+  <p:clrMapOvr>
+    <a:masterClrMapping/>
+  </p:clrMapOvr>
+</p:sld>
+</file>
+
+<file path=ppt/slides/slide22.xml><?xml version="1.0" encoding="utf-8"?>
+<p:sld xmlns:a="http://schemas.openxmlformats.org/drawingml/2006/main" xmlns:r="http://schemas.openxmlformats.org/officeDocument/2006/relationships" xmlns:p="http://schemas.openxmlformats.org/presentationml/2006/main">
+  <p:cSld>
+    <p:spTree>
+      <p:nvGrpSpPr>
+        <p:cNvPr id="1" name=""/>
+        <p:cNvGrpSpPr/>
+        <p:nvPr/>
+      </p:nvGrpSpPr>
+      <p:grpSpPr>
+        <a:xfrm>
+          <a:off x="0" y="0"/>
+          <a:ext cx="0" cy="0"/>
+          <a:chOff x="0" y="0"/>
+          <a:chExt cx="0" cy="0"/>
+        </a:xfrm>
+      </p:grpSpPr>
+      <p:pic>
+        <p:nvPicPr>
+          <p:cNvPr id="3" name="Picture 2">
+            <a:extLst>
+              <a:ext uri="{FF2B5EF4-FFF2-40B4-BE49-F238E27FC236}">
+                <a16:creationId xmlns:a16="http://schemas.microsoft.com/office/drawing/2014/main" id="{0A3ADDA0-1AEC-44EA-888D-9A5480B07E14}"/>
+              </a:ext>
+            </a:extLst>
+          </p:cNvPr>
+          <p:cNvPicPr>
+            <a:picLocks noChangeAspect="1"/>
+          </p:cNvPicPr>
+          <p:nvPr/>
+        </p:nvPicPr>
+        <p:blipFill>
+          <a:blip r:embed="rId3"/>
+          <a:stretch>
+            <a:fillRect/>
+          </a:stretch>
+        </p:blipFill>
+        <p:spPr>
+          <a:xfrm>
+            <a:off x="1632857" y="0"/>
+            <a:ext cx="8926286" cy="6858000"/>
+          </a:xfrm>
+          <a:prstGeom prst="rect">
+            <a:avLst/>
+          </a:prstGeom>
+        </p:spPr>
+      </p:pic>
+    </p:spTree>
+    <p:extLst>
+      <p:ext uri="{BB962C8B-B14F-4D97-AF65-F5344CB8AC3E}">
+        <p14:creationId xmlns:p14="http://schemas.microsoft.com/office/powerpoint/2010/main" val="1897069483"/>
+      </p:ext>
+    </p:extLst>
+  </p:cSld>
+  <p:clrMapOvr>
+    <a:masterClrMapping/>
+  </p:clrMapOvr>
+</p:sld>
+</file>
+
+<file path=ppt/slides/slide23.xml><?xml version="1.0" encoding="utf-8"?>
+<p:sld xmlns:a="http://schemas.openxmlformats.org/drawingml/2006/main" xmlns:r="http://schemas.openxmlformats.org/officeDocument/2006/relationships" xmlns:p="http://schemas.openxmlformats.org/presentationml/2006/main">
+  <p:cSld>
+    <p:spTree>
+      <p:nvGrpSpPr>
+        <p:cNvPr id="1" name=""/>
+        <p:cNvGrpSpPr/>
+        <p:nvPr/>
+      </p:nvGrpSpPr>
+      <p:grpSpPr>
+        <a:xfrm>
+          <a:off x="0" y="0"/>
+          <a:ext cx="0" cy="0"/>
+          <a:chOff x="0" y="0"/>
+          <a:chExt cx="0" cy="0"/>
+        </a:xfrm>
+      </p:grpSpPr>
+      <p:pic>
+        <p:nvPicPr>
+          <p:cNvPr id="2" name="Picture 1">
+            <a:extLst>
+              <a:ext uri="{FF2B5EF4-FFF2-40B4-BE49-F238E27FC236}">
+                <a16:creationId xmlns:a16="http://schemas.microsoft.com/office/drawing/2014/main" id="{F5D70DDE-DA9C-4D8D-B67F-E6AC700A0152}"/>
+              </a:ext>
+            </a:extLst>
+          </p:cNvPr>
+          <p:cNvPicPr>
+            <a:picLocks noChangeAspect="1"/>
+          </p:cNvPicPr>
+          <p:nvPr/>
+        </p:nvPicPr>
+        <p:blipFill>
+          <a:blip r:embed="rId3"/>
+          <a:stretch>
+            <a:fillRect/>
+          </a:stretch>
+        </p:blipFill>
+        <p:spPr>
+          <a:xfrm>
+            <a:off x="1656835" y="0"/>
+            <a:ext cx="8878330" cy="6858000"/>
+          </a:xfrm>
+          <a:prstGeom prst="rect">
+            <a:avLst/>
+          </a:prstGeom>
+        </p:spPr>
+      </p:pic>
+    </p:spTree>
+    <p:extLst>
+      <p:ext uri="{BB962C8B-B14F-4D97-AF65-F5344CB8AC3E}">
+        <p14:creationId xmlns:p14="http://schemas.microsoft.com/office/powerpoint/2010/main" val="3797565741"/>
+      </p:ext>
+    </p:extLst>
+  </p:cSld>
+  <p:clrMapOvr>
+    <a:masterClrMapping/>
+  </p:clrMapOvr>
+</p:sld>
+</file>
+
+<file path=ppt/slides/slide24.xml><?xml version="1.0" encoding="utf-8"?>
+<p:sld xmlns:a="http://schemas.openxmlformats.org/drawingml/2006/main" xmlns:r="http://schemas.openxmlformats.org/officeDocument/2006/relationships" xmlns:p="http://schemas.openxmlformats.org/presentationml/2006/main">
+  <p:cSld>
+    <p:spTree>
+      <p:nvGrpSpPr>
+        <p:cNvPr id="1" name=""/>
+        <p:cNvGrpSpPr/>
+        <p:nvPr/>
+      </p:nvGrpSpPr>
+      <p:grpSpPr>
+        <a:xfrm>
+          <a:off x="0" y="0"/>
+          <a:ext cx="0" cy="0"/>
+          <a:chOff x="0" y="0"/>
+          <a:chExt cx="0" cy="0"/>
+        </a:xfrm>
+      </p:grpSpPr>
+      <p:pic>
+        <p:nvPicPr>
+          <p:cNvPr id="3" name="Picture 2">
+            <a:extLst>
+              <a:ext uri="{FF2B5EF4-FFF2-40B4-BE49-F238E27FC236}">
+                <a16:creationId xmlns:a16="http://schemas.microsoft.com/office/drawing/2014/main" id="{DE8BEC03-713D-4039-8541-BBD2C84114B6}"/>
+              </a:ext>
+            </a:extLst>
+          </p:cNvPr>
+          <p:cNvPicPr>
+            <a:picLocks noChangeAspect="1"/>
+          </p:cNvPicPr>
+          <p:nvPr/>
+        </p:nvPicPr>
+        <p:blipFill>
+          <a:blip r:embed="rId3"/>
+          <a:stretch>
+            <a:fillRect/>
+          </a:stretch>
+        </p:blipFill>
+        <p:spPr>
+          <a:xfrm>
+            <a:off x="104775" y="1499532"/>
+            <a:ext cx="11982450" cy="3858936"/>
           </a:xfrm>
           <a:prstGeom prst="rect">
             <a:avLst/>
@@ -6553,7 +7936,7 @@
 </p:sld>
 </file>
 
-<file path=ppt/slides/slide21.xml><?xml version="1.0" encoding="utf-8"?>
+<file path=ppt/slides/slide25.xml><?xml version="1.0" encoding="utf-8"?>
 <p:sld xmlns:a="http://schemas.openxmlformats.org/drawingml/2006/main" xmlns:r="http://schemas.openxmlformats.org/officeDocument/2006/relationships" xmlns:p="http://schemas.openxmlformats.org/presentationml/2006/main">
   <p:cSld>
     <p:spTree>
@@ -6613,7 +7996,7 @@
 </p:sld>
 </file>
 
-<file path=ppt/slides/slide22.xml><?xml version="1.0" encoding="utf-8"?>
+<file path=ppt/slides/slide26.xml><?xml version="1.0" encoding="utf-8"?>
 <p:sld xmlns:a="http://schemas.openxmlformats.org/drawingml/2006/main" xmlns:r="http://schemas.openxmlformats.org/officeDocument/2006/relationships" xmlns:p="http://schemas.openxmlformats.org/presentationml/2006/main">
   <p:cSld>
     <p:spTree>
@@ -6673,7 +8056,7 @@
 </p:sld>
 </file>
 
-<file path=ppt/slides/slide23.xml><?xml version="1.0" encoding="utf-8"?>
+<file path=ppt/slides/slide27.xml><?xml version="1.0" encoding="utf-8"?>
 <p:sld xmlns:a="http://schemas.openxmlformats.org/drawingml/2006/main" xmlns:r="http://schemas.openxmlformats.org/officeDocument/2006/relationships" xmlns:p="http://schemas.openxmlformats.org/presentationml/2006/main">
   <p:cSld>
     <p:spTree>
@@ -6733,7 +8116,7 @@
 </p:sld>
 </file>
 
-<file path=ppt/slides/slide24.xml><?xml version="1.0" encoding="utf-8"?>
+<file path=ppt/slides/slide28.xml><?xml version="1.0" encoding="utf-8"?>
 <p:sld xmlns:a="http://schemas.openxmlformats.org/drawingml/2006/main" xmlns:r="http://schemas.openxmlformats.org/officeDocument/2006/relationships" xmlns:p="http://schemas.openxmlformats.org/presentationml/2006/main">
   <p:cSld>
     <p:spTree>
@@ -6793,7 +8176,7 @@
 </p:sld>
 </file>
 
-<file path=ppt/slides/slide25.xml><?xml version="1.0" encoding="utf-8"?>
+<file path=ppt/slides/slide29.xml><?xml version="1.0" encoding="utf-8"?>
 <p:sld xmlns:a="http://schemas.openxmlformats.org/drawingml/2006/main" xmlns:r="http://schemas.openxmlformats.org/officeDocument/2006/relationships" xmlns:p="http://schemas.openxmlformats.org/presentationml/2006/main">
   <p:cSld>
     <p:spTree>
@@ -6853,7 +8236,67 @@
 </p:sld>
 </file>
 
-<file path=ppt/slides/slide26.xml><?xml version="1.0" encoding="utf-8"?>
+<file path=ppt/slides/slide3.xml><?xml version="1.0" encoding="utf-8"?>
+<p:sld xmlns:a="http://schemas.openxmlformats.org/drawingml/2006/main" xmlns:r="http://schemas.openxmlformats.org/officeDocument/2006/relationships" xmlns:p="http://schemas.openxmlformats.org/presentationml/2006/main">
+  <p:cSld>
+    <p:spTree>
+      <p:nvGrpSpPr>
+        <p:cNvPr id="1" name=""/>
+        <p:cNvGrpSpPr/>
+        <p:nvPr/>
+      </p:nvGrpSpPr>
+      <p:grpSpPr>
+        <a:xfrm>
+          <a:off x="0" y="0"/>
+          <a:ext cx="0" cy="0"/>
+          <a:chOff x="0" y="0"/>
+          <a:chExt cx="0" cy="0"/>
+        </a:xfrm>
+      </p:grpSpPr>
+      <p:pic>
+        <p:nvPicPr>
+          <p:cNvPr id="2" name="Picture 1">
+            <a:extLst>
+              <a:ext uri="{FF2B5EF4-FFF2-40B4-BE49-F238E27FC236}">
+                <a16:creationId xmlns:a16="http://schemas.microsoft.com/office/drawing/2014/main" id="{B0F9EC2F-6583-463E-AB6A-E224307A8095}"/>
+              </a:ext>
+            </a:extLst>
+          </p:cNvPr>
+          <p:cNvPicPr>
+            <a:picLocks noChangeAspect="1"/>
+          </p:cNvPicPr>
+          <p:nvPr/>
+        </p:nvPicPr>
+        <p:blipFill>
+          <a:blip r:embed="rId2"/>
+          <a:stretch>
+            <a:fillRect/>
+          </a:stretch>
+        </p:blipFill>
+        <p:spPr>
+          <a:xfrm>
+            <a:off x="1861850" y="196656"/>
+            <a:ext cx="8468299" cy="6464688"/>
+          </a:xfrm>
+          <a:prstGeom prst="rect">
+            <a:avLst/>
+          </a:prstGeom>
+        </p:spPr>
+      </p:pic>
+    </p:spTree>
+    <p:extLst>
+      <p:ext uri="{BB962C8B-B14F-4D97-AF65-F5344CB8AC3E}">
+        <p14:creationId xmlns:p14="http://schemas.microsoft.com/office/powerpoint/2010/main" val="4208967298"/>
+      </p:ext>
+    </p:extLst>
+  </p:cSld>
+  <p:clrMapOvr>
+    <a:masterClrMapping/>
+  </p:clrMapOvr>
+</p:sld>
+</file>
+
+<file path=ppt/slides/slide30.xml><?xml version="1.0" encoding="utf-8"?>
 <p:sld xmlns:a="http://schemas.openxmlformats.org/drawingml/2006/main" xmlns:r="http://schemas.openxmlformats.org/officeDocument/2006/relationships" xmlns:p="http://schemas.openxmlformats.org/presentationml/2006/main">
   <p:cSld>
     <p:spTree>
@@ -6913,7 +8356,7 @@
 </p:sld>
 </file>
 
-<file path=ppt/slides/slide27.xml><?xml version="1.0" encoding="utf-8"?>
+<file path=ppt/slides/slide31.xml><?xml version="1.0" encoding="utf-8"?>
 <p:sld xmlns:a="http://schemas.openxmlformats.org/drawingml/2006/main" xmlns:r="http://schemas.openxmlformats.org/officeDocument/2006/relationships" xmlns:p="http://schemas.openxmlformats.org/presentationml/2006/main">
   <p:cSld>
     <p:spTree>
@@ -6973,7 +8416,187 @@
 </p:sld>
 </file>
 
-<file path=ppt/slides/slide28.xml><?xml version="1.0" encoding="utf-8"?>
+<file path=ppt/slides/slide32.xml><?xml version="1.0" encoding="utf-8"?>
+<p:sld xmlns:a="http://schemas.openxmlformats.org/drawingml/2006/main" xmlns:r="http://schemas.openxmlformats.org/officeDocument/2006/relationships" xmlns:p="http://schemas.openxmlformats.org/presentationml/2006/main">
+  <p:cSld>
+    <p:spTree>
+      <p:nvGrpSpPr>
+        <p:cNvPr id="1" name=""/>
+        <p:cNvGrpSpPr/>
+        <p:nvPr/>
+      </p:nvGrpSpPr>
+      <p:grpSpPr>
+        <a:xfrm>
+          <a:off x="0" y="0"/>
+          <a:ext cx="0" cy="0"/>
+          <a:chOff x="0" y="0"/>
+          <a:chExt cx="0" cy="0"/>
+        </a:xfrm>
+      </p:grpSpPr>
+      <p:pic>
+        <p:nvPicPr>
+          <p:cNvPr id="2" name="Picture 1">
+            <a:extLst>
+              <a:ext uri="{FF2B5EF4-FFF2-40B4-BE49-F238E27FC236}">
+                <a16:creationId xmlns:a16="http://schemas.microsoft.com/office/drawing/2014/main" id="{461DEDC4-BCD2-497B-98E8-4298091A4E6A}"/>
+              </a:ext>
+            </a:extLst>
+          </p:cNvPr>
+          <p:cNvPicPr>
+            <a:picLocks noChangeAspect="1"/>
+          </p:cNvPicPr>
+          <p:nvPr/>
+        </p:nvPicPr>
+        <p:blipFill>
+          <a:blip r:embed="rId3"/>
+          <a:stretch>
+            <a:fillRect/>
+          </a:stretch>
+        </p:blipFill>
+        <p:spPr>
+          <a:xfrm>
+            <a:off x="270621" y="0"/>
+            <a:ext cx="11650757" cy="6858000"/>
+          </a:xfrm>
+          <a:prstGeom prst="rect">
+            <a:avLst/>
+          </a:prstGeom>
+        </p:spPr>
+      </p:pic>
+    </p:spTree>
+    <p:extLst>
+      <p:ext uri="{BB962C8B-B14F-4D97-AF65-F5344CB8AC3E}">
+        <p14:creationId xmlns:p14="http://schemas.microsoft.com/office/powerpoint/2010/main" val="514178268"/>
+      </p:ext>
+    </p:extLst>
+  </p:cSld>
+  <p:clrMapOvr>
+    <a:masterClrMapping/>
+  </p:clrMapOvr>
+</p:sld>
+</file>
+
+<file path=ppt/slides/slide33.xml><?xml version="1.0" encoding="utf-8"?>
+<p:sld xmlns:a="http://schemas.openxmlformats.org/drawingml/2006/main" xmlns:r="http://schemas.openxmlformats.org/officeDocument/2006/relationships" xmlns:p="http://schemas.openxmlformats.org/presentationml/2006/main">
+  <p:cSld>
+    <p:spTree>
+      <p:nvGrpSpPr>
+        <p:cNvPr id="1" name=""/>
+        <p:cNvGrpSpPr/>
+        <p:nvPr/>
+      </p:nvGrpSpPr>
+      <p:grpSpPr>
+        <a:xfrm>
+          <a:off x="0" y="0"/>
+          <a:ext cx="0" cy="0"/>
+          <a:chOff x="0" y="0"/>
+          <a:chExt cx="0" cy="0"/>
+        </a:xfrm>
+      </p:grpSpPr>
+      <p:pic>
+        <p:nvPicPr>
+          <p:cNvPr id="2" name="Picture 1">
+            <a:extLst>
+              <a:ext uri="{FF2B5EF4-FFF2-40B4-BE49-F238E27FC236}">
+                <a16:creationId xmlns:a16="http://schemas.microsoft.com/office/drawing/2014/main" id="{562C95BC-981B-4EF3-8AA9-09023415565D}"/>
+              </a:ext>
+            </a:extLst>
+          </p:cNvPr>
+          <p:cNvPicPr>
+            <a:picLocks noChangeAspect="1"/>
+          </p:cNvPicPr>
+          <p:nvPr/>
+        </p:nvPicPr>
+        <p:blipFill>
+          <a:blip r:embed="rId3"/>
+          <a:stretch>
+            <a:fillRect/>
+          </a:stretch>
+        </p:blipFill>
+        <p:spPr>
+          <a:xfrm>
+            <a:off x="1933575" y="681037"/>
+            <a:ext cx="8324850" cy="5495925"/>
+          </a:xfrm>
+          <a:prstGeom prst="rect">
+            <a:avLst/>
+          </a:prstGeom>
+        </p:spPr>
+      </p:pic>
+    </p:spTree>
+    <p:extLst>
+      <p:ext uri="{BB962C8B-B14F-4D97-AF65-F5344CB8AC3E}">
+        <p14:creationId xmlns:p14="http://schemas.microsoft.com/office/powerpoint/2010/main" val="2860934117"/>
+      </p:ext>
+    </p:extLst>
+  </p:cSld>
+  <p:clrMapOvr>
+    <a:masterClrMapping/>
+  </p:clrMapOvr>
+</p:sld>
+</file>
+
+<file path=ppt/slides/slide34.xml><?xml version="1.0" encoding="utf-8"?>
+<p:sld xmlns:a="http://schemas.openxmlformats.org/drawingml/2006/main" xmlns:r="http://schemas.openxmlformats.org/officeDocument/2006/relationships" xmlns:p="http://schemas.openxmlformats.org/presentationml/2006/main">
+  <p:cSld>
+    <p:spTree>
+      <p:nvGrpSpPr>
+        <p:cNvPr id="1" name=""/>
+        <p:cNvGrpSpPr/>
+        <p:nvPr/>
+      </p:nvGrpSpPr>
+      <p:grpSpPr>
+        <a:xfrm>
+          <a:off x="0" y="0"/>
+          <a:ext cx="0" cy="0"/>
+          <a:chOff x="0" y="0"/>
+          <a:chExt cx="0" cy="0"/>
+        </a:xfrm>
+      </p:grpSpPr>
+      <p:pic>
+        <p:nvPicPr>
+          <p:cNvPr id="2" name="Picture 1">
+            <a:extLst>
+              <a:ext uri="{FF2B5EF4-FFF2-40B4-BE49-F238E27FC236}">
+                <a16:creationId xmlns:a16="http://schemas.microsoft.com/office/drawing/2014/main" id="{027C67FF-D227-45EC-8A4D-B3B3FE18021B}"/>
+              </a:ext>
+            </a:extLst>
+          </p:cNvPr>
+          <p:cNvPicPr>
+            <a:picLocks noChangeAspect="1"/>
+          </p:cNvPicPr>
+          <p:nvPr/>
+        </p:nvPicPr>
+        <p:blipFill>
+          <a:blip r:embed="rId3"/>
+          <a:stretch>
+            <a:fillRect/>
+          </a:stretch>
+        </p:blipFill>
+        <p:spPr>
+          <a:xfrm>
+            <a:off x="1308759" y="0"/>
+            <a:ext cx="9574481" cy="6858000"/>
+          </a:xfrm>
+          <a:prstGeom prst="rect">
+            <a:avLst/>
+          </a:prstGeom>
+        </p:spPr>
+      </p:pic>
+    </p:spTree>
+    <p:extLst>
+      <p:ext uri="{BB962C8B-B14F-4D97-AF65-F5344CB8AC3E}">
+        <p14:creationId xmlns:p14="http://schemas.microsoft.com/office/powerpoint/2010/main" val="76848770"/>
+      </p:ext>
+    </p:extLst>
+  </p:cSld>
+  <p:clrMapOvr>
+    <a:masterClrMapping/>
+  </p:clrMapOvr>
+</p:sld>
+</file>
+
+<file path=ppt/slides/slide35.xml><?xml version="1.0" encoding="utf-8"?>
 <p:sld xmlns:a="http://schemas.openxmlformats.org/drawingml/2006/main" xmlns:r="http://schemas.openxmlformats.org/officeDocument/2006/relationships" xmlns:p="http://schemas.openxmlformats.org/presentationml/2006/main">
   <p:cSld>
     <p:spTree>
@@ -6993,7 +8616,7 @@
     </p:spTree>
     <p:extLst>
       <p:ext uri="{BB962C8B-B14F-4D97-AF65-F5344CB8AC3E}">
-        <p14:creationId xmlns:p14="http://schemas.microsoft.com/office/powerpoint/2010/main" val="514178268"/>
+        <p14:creationId xmlns:p14="http://schemas.microsoft.com/office/powerpoint/2010/main" val="510558860"/>
       </p:ext>
     </p:extLst>
   </p:cSld>
@@ -7003,7 +8626,7 @@
 </p:sld>
 </file>
 
-<file path=ppt/slides/slide29.xml><?xml version="1.0" encoding="utf-8"?>
+<file path=ppt/slides/slide36.xml><?xml version="1.0" encoding="utf-8"?>
 <p:sld xmlns:a="http://schemas.openxmlformats.org/drawingml/2006/main" xmlns:r="http://schemas.openxmlformats.org/officeDocument/2006/relationships" xmlns:p="http://schemas.openxmlformats.org/presentationml/2006/main">
   <p:cSld>
     <p:spTree>
@@ -7023,7 +8646,7 @@
     </p:spTree>
     <p:extLst>
       <p:ext uri="{BB962C8B-B14F-4D97-AF65-F5344CB8AC3E}">
-        <p14:creationId xmlns:p14="http://schemas.microsoft.com/office/powerpoint/2010/main" val="2860934117"/>
+        <p14:creationId xmlns:p14="http://schemas.microsoft.com/office/powerpoint/2010/main" val="4021019654"/>
       </p:ext>
     </p:extLst>
   </p:cSld>
@@ -7033,7 +8656,7 @@
 </p:sld>
 </file>
 
-<file path=ppt/slides/slide3.xml><?xml version="1.0" encoding="utf-8"?>
+<file path=ppt/slides/slide37.xml><?xml version="1.0" encoding="utf-8"?>
 <p:sld xmlns:a="http://schemas.openxmlformats.org/drawingml/2006/main" xmlns:r="http://schemas.openxmlformats.org/officeDocument/2006/relationships" xmlns:p="http://schemas.openxmlformats.org/presentationml/2006/main">
   <p:cSld>
     <p:spTree>
@@ -7050,40 +8673,70 @@
           <a:chExt cx="0" cy="0"/>
         </a:xfrm>
       </p:grpSpPr>
-      <p:pic>
-        <p:nvPicPr>
-          <p:cNvPr id="2" name="Picture 1">
-            <a:extLst>
-              <a:ext uri="{FF2B5EF4-FFF2-40B4-BE49-F238E27FC236}">
-                <a16:creationId xmlns:a16="http://schemas.microsoft.com/office/drawing/2014/main" id="{B0F9EC2F-6583-463E-AB6A-E224307A8095}"/>
-              </a:ext>
-            </a:extLst>
-          </p:cNvPr>
-          <p:cNvPicPr>
-            <a:picLocks noChangeAspect="1"/>
-          </p:cNvPicPr>
-          <p:nvPr/>
-        </p:nvPicPr>
-        <p:blipFill>
-          <a:blip r:embed="rId2"/>
-          <a:stretch>
-            <a:fillRect/>
-          </a:stretch>
-        </p:blipFill>
-        <p:spPr>
-          <a:xfrm>
-            <a:off x="1861850" y="196656"/>
-            <a:ext cx="8468299" cy="6464688"/>
-          </a:xfrm>
-          <a:prstGeom prst="rect">
-            <a:avLst/>
-          </a:prstGeom>
-        </p:spPr>
-      </p:pic>
     </p:spTree>
     <p:extLst>
       <p:ext uri="{BB962C8B-B14F-4D97-AF65-F5344CB8AC3E}">
-        <p14:creationId xmlns:p14="http://schemas.microsoft.com/office/powerpoint/2010/main" val="4208967298"/>
+        <p14:creationId xmlns:p14="http://schemas.microsoft.com/office/powerpoint/2010/main" val="4247179824"/>
+      </p:ext>
+    </p:extLst>
+  </p:cSld>
+  <p:clrMapOvr>
+    <a:masterClrMapping/>
+  </p:clrMapOvr>
+</p:sld>
+</file>
+
+<file path=ppt/slides/slide38.xml><?xml version="1.0" encoding="utf-8"?>
+<p:sld xmlns:a="http://schemas.openxmlformats.org/drawingml/2006/main" xmlns:r="http://schemas.openxmlformats.org/officeDocument/2006/relationships" xmlns:p="http://schemas.openxmlformats.org/presentationml/2006/main">
+  <p:cSld>
+    <p:spTree>
+      <p:nvGrpSpPr>
+        <p:cNvPr id="1" name=""/>
+        <p:cNvGrpSpPr/>
+        <p:nvPr/>
+      </p:nvGrpSpPr>
+      <p:grpSpPr>
+        <a:xfrm>
+          <a:off x="0" y="0"/>
+          <a:ext cx="0" cy="0"/>
+          <a:chOff x="0" y="0"/>
+          <a:chExt cx="0" cy="0"/>
+        </a:xfrm>
+      </p:grpSpPr>
+    </p:spTree>
+    <p:extLst>
+      <p:ext uri="{BB962C8B-B14F-4D97-AF65-F5344CB8AC3E}">
+        <p14:creationId xmlns:p14="http://schemas.microsoft.com/office/powerpoint/2010/main" val="594577123"/>
+      </p:ext>
+    </p:extLst>
+  </p:cSld>
+  <p:clrMapOvr>
+    <a:masterClrMapping/>
+  </p:clrMapOvr>
+</p:sld>
+</file>
+
+<file path=ppt/slides/slide39.xml><?xml version="1.0" encoding="utf-8"?>
+<p:sld xmlns:a="http://schemas.openxmlformats.org/drawingml/2006/main" xmlns:r="http://schemas.openxmlformats.org/officeDocument/2006/relationships" xmlns:p="http://schemas.openxmlformats.org/presentationml/2006/main">
+  <p:cSld>
+    <p:spTree>
+      <p:nvGrpSpPr>
+        <p:cNvPr id="1" name=""/>
+        <p:cNvGrpSpPr/>
+        <p:nvPr/>
+      </p:nvGrpSpPr>
+      <p:grpSpPr>
+        <a:xfrm>
+          <a:off x="0" y="0"/>
+          <a:ext cx="0" cy="0"/>
+          <a:chOff x="0" y="0"/>
+          <a:chExt cx="0" cy="0"/>
+        </a:xfrm>
+      </p:grpSpPr>
+    </p:spTree>
+    <p:extLst>
+      <p:ext uri="{BB962C8B-B14F-4D97-AF65-F5344CB8AC3E}">
+        <p14:creationId xmlns:p14="http://schemas.microsoft.com/office/powerpoint/2010/main" val="1813766727"/>
       </p:ext>
     </p:extLst>
   </p:cSld>
@@ -7174,6 +8827,96 @@
     <p:extLst>
       <p:ext uri="{BB962C8B-B14F-4D97-AF65-F5344CB8AC3E}">
         <p14:creationId xmlns:p14="http://schemas.microsoft.com/office/powerpoint/2010/main" val="1752804249"/>
+      </p:ext>
+    </p:extLst>
+  </p:cSld>
+  <p:clrMapOvr>
+    <a:masterClrMapping/>
+  </p:clrMapOvr>
+</p:sld>
+</file>
+
+<file path=ppt/slides/slide40.xml><?xml version="1.0" encoding="utf-8"?>
+<p:sld xmlns:a="http://schemas.openxmlformats.org/drawingml/2006/main" xmlns:r="http://schemas.openxmlformats.org/officeDocument/2006/relationships" xmlns:p="http://schemas.openxmlformats.org/presentationml/2006/main">
+  <p:cSld>
+    <p:spTree>
+      <p:nvGrpSpPr>
+        <p:cNvPr id="1" name=""/>
+        <p:cNvGrpSpPr/>
+        <p:nvPr/>
+      </p:nvGrpSpPr>
+      <p:grpSpPr>
+        <a:xfrm>
+          <a:off x="0" y="0"/>
+          <a:ext cx="0" cy="0"/>
+          <a:chOff x="0" y="0"/>
+          <a:chExt cx="0" cy="0"/>
+        </a:xfrm>
+      </p:grpSpPr>
+    </p:spTree>
+    <p:extLst>
+      <p:ext uri="{BB962C8B-B14F-4D97-AF65-F5344CB8AC3E}">
+        <p14:creationId xmlns:p14="http://schemas.microsoft.com/office/powerpoint/2010/main" val="360070266"/>
+      </p:ext>
+    </p:extLst>
+  </p:cSld>
+  <p:clrMapOvr>
+    <a:masterClrMapping/>
+  </p:clrMapOvr>
+</p:sld>
+</file>
+
+<file path=ppt/slides/slide41.xml><?xml version="1.0" encoding="utf-8"?>
+<p:sld xmlns:a="http://schemas.openxmlformats.org/drawingml/2006/main" xmlns:r="http://schemas.openxmlformats.org/officeDocument/2006/relationships" xmlns:p="http://schemas.openxmlformats.org/presentationml/2006/main">
+  <p:cSld>
+    <p:spTree>
+      <p:nvGrpSpPr>
+        <p:cNvPr id="1" name=""/>
+        <p:cNvGrpSpPr/>
+        <p:nvPr/>
+      </p:nvGrpSpPr>
+      <p:grpSpPr>
+        <a:xfrm>
+          <a:off x="0" y="0"/>
+          <a:ext cx="0" cy="0"/>
+          <a:chOff x="0" y="0"/>
+          <a:chExt cx="0" cy="0"/>
+        </a:xfrm>
+      </p:grpSpPr>
+    </p:spTree>
+    <p:extLst>
+      <p:ext uri="{BB962C8B-B14F-4D97-AF65-F5344CB8AC3E}">
+        <p14:creationId xmlns:p14="http://schemas.microsoft.com/office/powerpoint/2010/main" val="2017617838"/>
+      </p:ext>
+    </p:extLst>
+  </p:cSld>
+  <p:clrMapOvr>
+    <a:masterClrMapping/>
+  </p:clrMapOvr>
+</p:sld>
+</file>
+
+<file path=ppt/slides/slide42.xml><?xml version="1.0" encoding="utf-8"?>
+<p:sld xmlns:a="http://schemas.openxmlformats.org/drawingml/2006/main" xmlns:r="http://schemas.openxmlformats.org/officeDocument/2006/relationships" xmlns:p="http://schemas.openxmlformats.org/presentationml/2006/main">
+  <p:cSld>
+    <p:spTree>
+      <p:nvGrpSpPr>
+        <p:cNvPr id="1" name=""/>
+        <p:cNvGrpSpPr/>
+        <p:nvPr/>
+      </p:nvGrpSpPr>
+      <p:grpSpPr>
+        <a:xfrm>
+          <a:off x="0" y="0"/>
+          <a:ext cx="0" cy="0"/>
+          <a:chOff x="0" y="0"/>
+          <a:chExt cx="0" cy="0"/>
+        </a:xfrm>
+      </p:grpSpPr>
+    </p:spTree>
+    <p:extLst>
+      <p:ext uri="{BB962C8B-B14F-4D97-AF65-F5344CB8AC3E}">
+        <p14:creationId xmlns:p14="http://schemas.microsoft.com/office/powerpoint/2010/main" val="2867306142"/>
       </p:ext>
     </p:extLst>
   </p:cSld>

</xml_diff>